<commit_message>
Add new presentation materials and update slides for Document AI evolution
- Created new Mermaid diagram files for Document AI timeline, technology comparison, and technology evolution Gantt chart.
- Updated the vision_transformers_slides.md to include a Gantt chart representation of the industry-wide evolution of Document AI, replacing the previous bullet-point format.
- Updated the vision_transformers.pptx file to reflect the latest changes in the presentation materials.
</commit_message>
<xml_diff>
--- a/presentation_materials/vision_transformers.pptx
+++ b/presentation_materials/vision_transformers.pptx
@@ -118,6 +118,11 @@
       </a:defRPr>
     </a:lvl9pPr>
   </p:defaultTextStyle>
+  <p:extLst>
+    <p:ext uri="{EFAFB233-063F-42B5-8137-9DF3F51BA10A}">
+      <p15:sldGuideLst xmlns:p15="http://schemas.microsoft.com/office/powerpoint/2012/main"/>
+    </p:ext>
+  </p:extLst>
 </p:presentation>
 </file>
 
@@ -270,7 +275,7 @@
           <a:p>
             <a:fld id="{4833E7F1-E723-EE41-B5FB-08192675C44B}" type="datetimeFigureOut">
               <a:rPr lang="en-US" smtClean="0"/>
-              <a:t>8/2/25</a:t>
+              <a:t>8/3/25</a:t>
             </a:fld>
             <a:endParaRPr lang="en-US"/>
           </a:p>
@@ -470,7 +475,7 @@
           <a:p>
             <a:fld id="{4833E7F1-E723-EE41-B5FB-08192675C44B}" type="datetimeFigureOut">
               <a:rPr lang="en-US" smtClean="0"/>
-              <a:t>8/2/25</a:t>
+              <a:t>8/3/25</a:t>
             </a:fld>
             <a:endParaRPr lang="en-US"/>
           </a:p>
@@ -680,7 +685,7 @@
           <a:p>
             <a:fld id="{4833E7F1-E723-EE41-B5FB-08192675C44B}" type="datetimeFigureOut">
               <a:rPr lang="en-US" smtClean="0"/>
-              <a:t>8/2/25</a:t>
+              <a:t>8/3/25</a:t>
             </a:fld>
             <a:endParaRPr lang="en-US"/>
           </a:p>
@@ -880,7 +885,7 @@
           <a:p>
             <a:fld id="{4833E7F1-E723-EE41-B5FB-08192675C44B}" type="datetimeFigureOut">
               <a:rPr lang="en-US" smtClean="0"/>
-              <a:t>8/2/25</a:t>
+              <a:t>8/3/25</a:t>
             </a:fld>
             <a:endParaRPr lang="en-US"/>
           </a:p>
@@ -1156,7 +1161,7 @@
           <a:p>
             <a:fld id="{4833E7F1-E723-EE41-B5FB-08192675C44B}" type="datetimeFigureOut">
               <a:rPr lang="en-US" smtClean="0"/>
-              <a:t>8/2/25</a:t>
+              <a:t>8/3/25</a:t>
             </a:fld>
             <a:endParaRPr lang="en-US"/>
           </a:p>
@@ -1424,7 +1429,7 @@
           <a:p>
             <a:fld id="{4833E7F1-E723-EE41-B5FB-08192675C44B}" type="datetimeFigureOut">
               <a:rPr lang="en-US" smtClean="0"/>
-              <a:t>8/2/25</a:t>
+              <a:t>8/3/25</a:t>
             </a:fld>
             <a:endParaRPr lang="en-US"/>
           </a:p>
@@ -1839,7 +1844,7 @@
           <a:p>
             <a:fld id="{4833E7F1-E723-EE41-B5FB-08192675C44B}" type="datetimeFigureOut">
               <a:rPr lang="en-US" smtClean="0"/>
-              <a:t>8/2/25</a:t>
+              <a:t>8/3/25</a:t>
             </a:fld>
             <a:endParaRPr lang="en-US"/>
           </a:p>
@@ -1981,7 +1986,7 @@
           <a:p>
             <a:fld id="{4833E7F1-E723-EE41-B5FB-08192675C44B}" type="datetimeFigureOut">
               <a:rPr lang="en-US" smtClean="0"/>
-              <a:t>8/2/25</a:t>
+              <a:t>8/3/25</a:t>
             </a:fld>
             <a:endParaRPr lang="en-US"/>
           </a:p>
@@ -2094,7 +2099,7 @@
           <a:p>
             <a:fld id="{4833E7F1-E723-EE41-B5FB-08192675C44B}" type="datetimeFigureOut">
               <a:rPr lang="en-US" smtClean="0"/>
-              <a:t>8/2/25</a:t>
+              <a:t>8/3/25</a:t>
             </a:fld>
             <a:endParaRPr lang="en-US"/>
           </a:p>
@@ -2407,7 +2412,7 @@
           <a:p>
             <a:fld id="{4833E7F1-E723-EE41-B5FB-08192675C44B}" type="datetimeFigureOut">
               <a:rPr lang="en-US" smtClean="0"/>
-              <a:t>8/2/25</a:t>
+              <a:t>8/3/25</a:t>
             </a:fld>
             <a:endParaRPr lang="en-US"/>
           </a:p>
@@ -2696,7 +2701,7 @@
           <a:p>
             <a:fld id="{4833E7F1-E723-EE41-B5FB-08192675C44B}" type="datetimeFigureOut">
               <a:rPr lang="en-US" smtClean="0"/>
-              <a:t>8/2/25</a:t>
+              <a:t>8/3/25</a:t>
             </a:fld>
             <a:endParaRPr lang="en-US"/>
           </a:p>
@@ -2939,7 +2944,7 @@
           <a:p>
             <a:fld id="{4833E7F1-E723-EE41-B5FB-08192675C44B}" type="datetimeFigureOut">
               <a:rPr lang="en-US" smtClean="0"/>
-              <a:t>8/2/25</a:t>
+              <a:t>8/3/25</a:t>
             </a:fld>
             <a:endParaRPr lang="en-US"/>
           </a:p>
@@ -3379,7 +3384,7 @@
           <a:p>
             <a:r>
               <a:rPr lang="en-AU" b="1" dirty="0"/>
-              <a:t>Vision Transformers for Information Extraction?</a:t>
+              <a:t>LMMs for Information Extraction?</a:t>
             </a:r>
             <a:endParaRPr lang="en-US" dirty="0"/>
           </a:p>
@@ -3410,21 +3415,17 @@
           <a:p>
             <a:r>
               <a:rPr lang="en-AU" b="1" dirty="0"/>
-              <a:t>Business Context</a:t>
-            </a:r>
-            <a:r>
-              <a:rPr lang="en-AU" dirty="0"/>
-              <a:t>: Information Extraction within the SSD-DU Pipeline</a:t>
-            </a:r>
-          </a:p>
-          <a:p>
-            <a:r>
-              <a:rPr lang="en-AU" b="1" dirty="0"/>
-              <a:t>Notes</a:t>
-            </a:r>
-            <a:r>
-              <a:rPr lang="en-AU" dirty="0"/>
-              <a:t>: Welcome everyone. Today we're exploring a critical technology decision that could transform how we process tax document substantiation.</a:t>
+              <a:t>Context</a:t>
+            </a:r>
+            <a:r>
+              <a:rPr lang="en-AU" dirty="0"/>
+              <a:t>: PI45 The Large Multimodal Model Proof of Concept (LMM PoC)</a:t>
+            </a:r>
+          </a:p>
+          <a:p>
+            <a:r>
+              <a:rPr lang="en-AU" dirty="0"/>
+              <a:t>Information Extraction within the SSD-DU Pipeline using VLMs</a:t>
             </a:r>
           </a:p>
           <a:p>
@@ -3434,15 +3435,7 @@
             </a:r>
             <a:r>
               <a:rPr lang="en-AU" dirty="0"/>
-              <a:t>: During </a:t>
-            </a:r>
-            <a:r>
-              <a:rPr lang="en-AU" dirty="0" err="1"/>
-              <a:t>taxtime</a:t>
-            </a:r>
-            <a:r>
-              <a:rPr lang="en-AU" dirty="0"/>
-              <a:t>, the ATO processes thousands of expense claim documents daily. Taxpayers submit receipts, invoices, and statements to support their deductions, and audit officers must verify these claims by extracting key information from each document.</a:t>
+              <a:t>: During Tax Time, the SSD-DU Pipeline processes thousands of WRE expense claim documents daily. Taxpayers submit receipts, invoices, and statements to support their deductions, and audit officers must verify these claims by extracting key information from each document.</a:t>
             </a:r>
           </a:p>
           <a:p>
@@ -3452,7 +3445,7 @@
             </a:r>
             <a:r>
               <a:rPr lang="en-AU" dirty="0"/>
-              <a:t>: This information extraction is currently automated using </a:t>
+              <a:t>: The Information Extraction is currently automated using </a:t>
             </a:r>
             <a:r>
               <a:rPr lang="en-AU" dirty="0" err="1"/>
@@ -3466,7 +3459,7 @@
           <a:p>
             <a:r>
               <a:rPr lang="en-AU" b="1" dirty="0"/>
-              <a:t>Today's Question</a:t>
+              <a:t>LLM PoC Question</a:t>
             </a:r>
             <a:r>
               <a:rPr lang="en-AU" dirty="0"/>
@@ -6651,4 +6644,24 @@
     </a:ext>
   </a:extLst>
 </a:theme>
+</file>
+
+<file path=ppt/webextensions/taskpanes.xml><?xml version="1.0" encoding="utf-8"?>
+<wetp:taskpanes xmlns:wetp="http://schemas.microsoft.com/office/webextensions/taskpanes/2010/11">
+  <wetp:taskpane dockstate="right" visibility="0" width="350" row="0">
+    <wetp:webextensionref xmlns:r="http://schemas.openxmlformats.org/officeDocument/2006/relationships" r:id="rId1"/>
+  </wetp:taskpane>
+</wetp:taskpanes>
+</file>
+
+<file path=ppt/webextensions/webextension1.xml><?xml version="1.0" encoding="utf-8"?>
+<we:webextension xmlns:we="http://schemas.microsoft.com/office/webextensions/webextension/2010/11" id="{253879D2-680A-EE40-8364-667810F27185}">
+  <we:reference id="wa200006214" version="1.0.0.0" store="en-GB" storeType="OMEX"/>
+  <we:alternateReferences>
+    <we:reference id="WA200006214" version="1.0.0.0" store="WA200006214" storeType="OMEX"/>
+  </we:alternateReferences>
+  <we:properties/>
+  <we:bindings/>
+  <we:snapshot xmlns:r="http://schemas.openxmlformats.org/officeDocument/2006/relationships"/>
+</we:webextension>
 </file>
</xml_diff>

<commit_message>
✨ feat: update presentation materials with new diagrams for Vision Transformers, including input processing, transformer stack, and language generation
</commit_message>
<xml_diff>
--- a/presentation_materials/vision_transformers.pptx
+++ b/presentation_materials/vision_transformers.pptx
@@ -8,8 +8,8 @@
     <p:sldId id="258" r:id="rId2"/>
     <p:sldId id="260" r:id="rId3"/>
     <p:sldId id="262" r:id="rId4"/>
-    <p:sldId id="263" r:id="rId5"/>
-    <p:sldId id="266" r:id="rId6"/>
+    <p:sldId id="276" r:id="rId5"/>
+    <p:sldId id="277" r:id="rId6"/>
     <p:sldId id="264" r:id="rId7"/>
     <p:sldId id="267" r:id="rId8"/>
     <p:sldId id="273" r:id="rId9"/>
@@ -5195,7 +5195,7 @@
           <p:cNvPr id="2" name="Title 1">
             <a:extLst>
               <a:ext uri="{FF2B5EF4-FFF2-40B4-BE49-F238E27FC236}">
-                <a16:creationId xmlns:a16="http://schemas.microsoft.com/office/drawing/2014/main" id="{4FC45C01-366D-BC21-AEFC-7B975A99157D}"/>
+                <a16:creationId xmlns:a16="http://schemas.microsoft.com/office/drawing/2014/main" id="{7E573CBD-6ACA-7449-6049-B29BED0BF12C}"/>
               </a:ext>
             </a:extLst>
           </p:cNvPr>
@@ -5219,113 +5219,39 @@
           </a:p>
         </p:txBody>
       </p:sp>
-      <p:sp>
-        <p:nvSpPr>
-          <p:cNvPr id="3" name="Content Placeholder 2">
-            <a:extLst>
-              <a:ext uri="{FF2B5EF4-FFF2-40B4-BE49-F238E27FC236}">
-                <a16:creationId xmlns:a16="http://schemas.microsoft.com/office/drawing/2014/main" id="{2AAEF0C2-3AFE-FFB3-613A-60C2BA07BE23}"/>
-              </a:ext>
-            </a:extLst>
-          </p:cNvPr>
-          <p:cNvSpPr>
-            <a:spLocks noGrp="1"/>
-          </p:cNvSpPr>
+      <p:pic>
+        <p:nvPicPr>
+          <p:cNvPr id="5" name="Content Placeholder 4">
+            <a:extLst>
+              <a:ext uri="{FF2B5EF4-FFF2-40B4-BE49-F238E27FC236}">
+                <a16:creationId xmlns:a16="http://schemas.microsoft.com/office/drawing/2014/main" id="{CFDB5C44-56FF-A017-98BF-9CCE21AA8121}"/>
+              </a:ext>
+            </a:extLst>
+          </p:cNvPr>
+          <p:cNvPicPr>
+            <a:picLocks noGrp="1" noChangeAspect="1"/>
+          </p:cNvPicPr>
           <p:nvPr>
             <p:ph idx="1"/>
           </p:nvPr>
-        </p:nvSpPr>
+        </p:nvPicPr>
+        <p:blipFill>
+          <a:blip r:embed="rId2"/>
+          <a:stretch>
+            <a:fillRect/>
+          </a:stretch>
+        </p:blipFill>
         <p:spPr>
           <a:xfrm>
-            <a:off x="838200" y="1825625"/>
-            <a:ext cx="10515600" cy="3114510"/>
+            <a:off x="838200" y="2177151"/>
+            <a:ext cx="10515600" cy="970399"/>
           </a:xfrm>
         </p:spPr>
-        <p:txBody>
-          <a:bodyPr/>
-          <a:lstStyle/>
-          <a:p>
-            <a:r>
-              <a:rPr lang="en-AU" b="1" dirty="0"/>
-              <a:t>Industry Timeline</a:t>
-            </a:r>
-            <a:r>
-              <a:rPr lang="en-AU" dirty="0"/>
-              <a:t> (Not ATO-specific):</a:t>
-            </a:r>
-          </a:p>
-          <a:p>
-            <a:r>
-              <a:rPr lang="en-AU" b="1" dirty="0"/>
-              <a:t>Pre-2018</a:t>
-            </a:r>
-            <a:r>
-              <a:rPr lang="en-AU" dirty="0"/>
-              <a:t>: OCR + Rule-based parsing</a:t>
-            </a:r>
-          </a:p>
-          <a:p>
-            <a:r>
-              <a:rPr lang="en-AU" b="1" dirty="0"/>
-              <a:t>2018-2020</a:t>
-            </a:r>
-            <a:r>
-              <a:rPr lang="en-AU" dirty="0"/>
-              <a:t>: CNN-based document analysis</a:t>
-            </a:r>
-          </a:p>
-          <a:p>
-            <a:r>
-              <a:rPr lang="en-AU" b="1" dirty="0"/>
-              <a:t>2020</a:t>
-            </a:r>
-            <a:r>
-              <a:rPr lang="en-AU" dirty="0"/>
-              <a:t>: </a:t>
-            </a:r>
-            <a:r>
-              <a:rPr lang="en-AU" dirty="0" err="1"/>
-              <a:t>LayoutLM</a:t>
-            </a:r>
-            <a:r>
-              <a:rPr lang="en-AU" dirty="0"/>
-              <a:t> - First transformer for documents</a:t>
-            </a:r>
-          </a:p>
-          <a:p>
-            <a:r>
-              <a:rPr lang="en-AU" b="1" dirty="0"/>
-              <a:t>2021-2023</a:t>
-            </a:r>
-            <a:r>
-              <a:rPr lang="en-AU" dirty="0"/>
-              <a:t>: LayoutLMv2, LayoutLMv3 iterations</a:t>
-            </a:r>
-          </a:p>
-          <a:p>
-            <a:r>
-              <a:rPr lang="en-AU" b="1" dirty="0"/>
-              <a:t>2023+</a:t>
-            </a:r>
-            <a:r>
-              <a:rPr lang="en-AU" dirty="0"/>
-              <a:t>: Vision-Language Models (</a:t>
-            </a:r>
-            <a:r>
-              <a:rPr lang="en-AU" dirty="0" err="1"/>
-              <a:t>InternVL</a:t>
-            </a:r>
-            <a:r>
-              <a:rPr lang="en-AU" dirty="0"/>
-              <a:t>, Llama-Vision)</a:t>
-            </a:r>
-          </a:p>
-        </p:txBody>
-      </p:sp>
+      </p:pic>
     </p:spTree>
     <p:extLst>
       <p:ext uri="{BB962C8B-B14F-4D97-AF65-F5344CB8AC3E}">
-        <p14:creationId xmlns:p14="http://schemas.microsoft.com/office/powerpoint/2010/main" val="3573844896"/>
+        <p14:creationId xmlns:p14="http://schemas.microsoft.com/office/powerpoint/2010/main" val="3786486015"/>
       </p:ext>
     </p:extLst>
   </p:cSld>
@@ -5357,7 +5283,7 @@
           <p:cNvPr id="2" name="Title 1">
             <a:extLst>
               <a:ext uri="{FF2B5EF4-FFF2-40B4-BE49-F238E27FC236}">
-                <a16:creationId xmlns:a16="http://schemas.microsoft.com/office/drawing/2014/main" id="{9B3E8269-00B7-81E1-BBB3-E0FE77307DFD}"/>
+                <a16:creationId xmlns:a16="http://schemas.microsoft.com/office/drawing/2014/main" id="{3E371FC9-6D97-845F-C08A-443AAE87B455}"/>
               </a:ext>
             </a:extLst>
           </p:cNvPr>
@@ -5374,12 +5300,8 @@
           <a:lstStyle/>
           <a:p>
             <a:r>
-              <a:rPr lang="en-AU" b="1" dirty="0" err="1"/>
-              <a:t>LayoutLM</a:t>
-            </a:r>
-            <a:r>
-              <a:rPr lang="en-AU" b="1" dirty="0"/>
-              <a:t> IE at the ATO</a:t>
+              <a:rPr lang="en-AU" b="1" dirty="0"/>
+              <a:t>LayoutLMv1 Critical Limitations</a:t>
             </a:r>
             <a:endParaRPr lang="en-US" dirty="0"/>
           </a:p>
@@ -5387,10 +5309,10 @@
       </p:sp>
       <p:pic>
         <p:nvPicPr>
-          <p:cNvPr id="5" name="Content Placeholder 4">
-            <a:extLst>
-              <a:ext uri="{FF2B5EF4-FFF2-40B4-BE49-F238E27FC236}">
-                <a16:creationId xmlns:a16="http://schemas.microsoft.com/office/drawing/2014/main" id="{3437AF88-C26E-496F-9327-5B32D6976E51}"/>
+          <p:cNvPr id="6" name="Content Placeholder 5" descr="A diagram of a diagram&#10;&#10;AI-generated content may be incorrect.">
+            <a:extLst>
+              <a:ext uri="{FF2B5EF4-FFF2-40B4-BE49-F238E27FC236}">
+                <a16:creationId xmlns:a16="http://schemas.microsoft.com/office/drawing/2014/main" id="{B1E4D399-616E-5E57-D6EA-E92A4E2521E1}"/>
               </a:ext>
             </a:extLst>
           </p:cNvPr>
@@ -5409,12 +5331,9 @@
         </p:blipFill>
         <p:spPr>
           <a:xfrm>
-            <a:off x="1066801" y="1825624"/>
-            <a:ext cx="4465498" cy="2486883"/>
+            <a:off x="838200" y="2092629"/>
+            <a:ext cx="5181600" cy="3817330"/>
           </a:xfrm>
-          <a:prstGeom prst="rect">
-            <a:avLst/>
-          </a:prstGeom>
         </p:spPr>
       </p:pic>
       <p:sp>
@@ -5422,7 +5341,7 @@
           <p:cNvPr id="4" name="Content Placeholder 3">
             <a:extLst>
               <a:ext uri="{FF2B5EF4-FFF2-40B4-BE49-F238E27FC236}">
-                <a16:creationId xmlns:a16="http://schemas.microsoft.com/office/drawing/2014/main" id="{4043A282-A154-BD12-1AEB-AC545D92C8AD}"/>
+                <a16:creationId xmlns:a16="http://schemas.microsoft.com/office/drawing/2014/main" id="{345CA0E9-9781-60EA-C481-EA0B65358EA2}"/>
               </a:ext>
             </a:extLst>
           </p:cNvPr>
@@ -5433,15 +5352,10 @@
             <p:ph sz="half" idx="2"/>
           </p:nvPr>
         </p:nvSpPr>
-        <p:spPr>
-          <a:xfrm>
-            <a:off x="6096000" y="1466188"/>
-            <a:ext cx="5181600" cy="4682302"/>
-          </a:xfrm>
-        </p:spPr>
+        <p:spPr/>
         <p:txBody>
           <a:bodyPr>
-            <a:normAutofit fontScale="55000" lnSpcReduction="20000"/>
+            <a:normAutofit fontScale="47500" lnSpcReduction="20000"/>
           </a:bodyPr>
           <a:lstStyle/>
           <a:p>
@@ -5450,15 +5364,7 @@
             </a:pPr>
             <a:r>
               <a:rPr lang="en-AU" b="1" dirty="0"/>
-              <a:t>How </a:t>
-            </a:r>
-            <a:r>
-              <a:rPr lang="en-AU" b="1" dirty="0" err="1"/>
-              <a:t>LayoutLM</a:t>
-            </a:r>
-            <a:r>
-              <a:rPr lang="en-AU" b="1" dirty="0"/>
-              <a:t> Captures Semantic Information</a:t>
+              <a:t>How LayoutLMv1 Captures Semantic Information</a:t>
             </a:r>
             <a:r>
               <a:rPr lang="en-AU" dirty="0"/>
@@ -5563,12 +5469,9 @@
           <a:p>
             <a:r>
               <a:rPr lang="en-AU" b="1" dirty="0"/>
-              <a:t>Visual Semantics (Not Implemented?</a:t>
-            </a:r>
-            <a:r>
-              <a:rPr lang="en-AU" dirty="0"/>
-              <a:t>:</a:t>
-            </a:r>
+              <a:t>Visual Semantics</a:t>
+            </a:r>
+            <a:endParaRPr lang="en-AU" dirty="0"/>
           </a:p>
           <a:p>
             <a:pPr lvl="1"/>
@@ -5660,7 +5563,7 @@
     </p:spTree>
     <p:extLst>
       <p:ext uri="{BB962C8B-B14F-4D97-AF65-F5344CB8AC3E}">
-        <p14:creationId xmlns:p14="http://schemas.microsoft.com/office/powerpoint/2010/main" val="2691279818"/>
+        <p14:creationId xmlns:p14="http://schemas.microsoft.com/office/powerpoint/2010/main" val="866989918"/>
       </p:ext>
     </p:extLst>
   </p:cSld>
@@ -6038,12 +5941,8 @@
           <a:p>
             <a:pPr lvl="1"/>
             <a:r>
-              <a:rPr lang="en-AU" dirty="0" err="1"/>
-              <a:t>Scewed</a:t>
-            </a:r>
-            <a:r>
-              <a:rPr lang="en-AU" dirty="0"/>
-              <a:t> images</a:t>
+              <a:rPr lang="en-AU" dirty="0"/>
+              <a:t>Skewed images</a:t>
             </a:r>
           </a:p>
         </p:txBody>
@@ -6092,7 +5991,7 @@
         </p:nvSpPr>
         <p:spPr>
           <a:xfrm>
-            <a:off x="1245104" y="4233714"/>
+            <a:off x="1245104" y="4759925"/>
             <a:ext cx="9407062" cy="646331"/>
           </a:xfrm>
           <a:prstGeom prst="rect">
@@ -6108,7 +6007,15 @@
           <a:p>
             <a:r>
               <a:rPr lang="en-US" dirty="0"/>
-              <a:t>Vision Transformers ensure a wholistic Document Understanding solution without suffering the Multiple Points of failure exhibited by the multistage </a:t>
+              <a:t>Vision Transformers ensure an integrated holistic Document Understanding solution without suffering the </a:t>
+            </a:r>
+            <a:r>
+              <a:rPr lang="en-US" b="1" dirty="0"/>
+              <a:t>Cascading Failure </a:t>
+            </a:r>
+            <a:r>
+              <a:rPr lang="en-US" dirty="0"/>
+              <a:t>exhibited by the multistage </a:t>
             </a:r>
             <a:r>
               <a:rPr lang="en-US" dirty="0" err="1"/>
@@ -6116,8 +6023,13 @@
             </a:r>
             <a:r>
               <a:rPr lang="en-US" dirty="0"/>
-              <a:t> IE approach</a:t>
-            </a:r>
+              <a:t> IE </a:t>
+            </a:r>
+            <a:r>
+              <a:rPr lang="en-US"/>
+              <a:t>approach above</a:t>
+            </a:r>
+            <a:endParaRPr lang="en-US" dirty="0"/>
           </a:p>
         </p:txBody>
       </p:sp>
@@ -6145,11 +6057,45 @@
         </p:blipFill>
         <p:spPr>
           <a:xfrm>
-            <a:off x="1245104" y="1165848"/>
+            <a:off x="1245104" y="2100309"/>
             <a:ext cx="10023616" cy="2133405"/>
           </a:xfrm>
         </p:spPr>
       </p:pic>
+      <p:sp>
+        <p:nvSpPr>
+          <p:cNvPr id="4" name="Title 1">
+            <a:extLst>
+              <a:ext uri="{FF2B5EF4-FFF2-40B4-BE49-F238E27FC236}">
+                <a16:creationId xmlns:a16="http://schemas.microsoft.com/office/drawing/2014/main" id="{91FEA1AD-A47B-1E30-D636-7A9D1D2E027E}"/>
+              </a:ext>
+            </a:extLst>
+          </p:cNvPr>
+          <p:cNvSpPr>
+            <a:spLocks noGrp="1"/>
+          </p:cNvSpPr>
+          <p:nvPr>
+            <p:ph type="title"/>
+          </p:nvPr>
+        </p:nvSpPr>
+        <p:spPr>
+          <a:xfrm>
+            <a:off x="838200" y="365125"/>
+            <a:ext cx="10515600" cy="1325563"/>
+          </a:xfrm>
+        </p:spPr>
+        <p:txBody>
+          <a:bodyPr/>
+          <a:lstStyle/>
+          <a:p>
+            <a:r>
+              <a:rPr lang="en-AU" b="1" dirty="0"/>
+              <a:t>Holistic Document Understanding</a:t>
+            </a:r>
+            <a:endParaRPr lang="en-US" dirty="0"/>
+          </a:p>
+        </p:txBody>
+      </p:sp>
     </p:spTree>
     <p:extLst>
       <p:ext uri="{BB962C8B-B14F-4D97-AF65-F5344CB8AC3E}">

</xml_diff>

<commit_message>
✨ feat: update Self-Attention diagram and presentation materials for clarity and consistency
</commit_message>
<xml_diff>
--- a/presentation_materials/vision_transformers.pptx
+++ b/presentation_materials/vision_transformers.pptx
@@ -13,13 +13,14 @@
     <p:sldId id="264" r:id="rId7"/>
     <p:sldId id="267" r:id="rId8"/>
     <p:sldId id="273" r:id="rId9"/>
-    <p:sldId id="268" r:id="rId10"/>
-    <p:sldId id="275" r:id="rId11"/>
-    <p:sldId id="269" r:id="rId12"/>
-    <p:sldId id="270" r:id="rId13"/>
-    <p:sldId id="271" r:id="rId14"/>
-    <p:sldId id="272" r:id="rId15"/>
-    <p:sldId id="274" r:id="rId16"/>
+    <p:sldId id="278" r:id="rId10"/>
+    <p:sldId id="268" r:id="rId11"/>
+    <p:sldId id="275" r:id="rId12"/>
+    <p:sldId id="269" r:id="rId13"/>
+    <p:sldId id="270" r:id="rId14"/>
+    <p:sldId id="271" r:id="rId15"/>
+    <p:sldId id="272" r:id="rId16"/>
+    <p:sldId id="274" r:id="rId17"/>
   </p:sldIdLst>
   <p:sldSz cx="12192000" cy="6858000"/>
   <p:notesSz cx="6858000" cy="9144000"/>
@@ -3504,6 +3505,174 @@
           <p:cNvPr id="2" name="Title 1">
             <a:extLst>
               <a:ext uri="{FF2B5EF4-FFF2-40B4-BE49-F238E27FC236}">
+                <a16:creationId xmlns:a16="http://schemas.microsoft.com/office/drawing/2014/main" id="{80214080-79D0-E287-0371-7509715FD53E}"/>
+              </a:ext>
+            </a:extLst>
+          </p:cNvPr>
+          <p:cNvSpPr>
+            <a:spLocks noGrp="1"/>
+          </p:cNvSpPr>
+          <p:nvPr>
+            <p:ph type="title"/>
+          </p:nvPr>
+        </p:nvSpPr>
+        <p:spPr/>
+        <p:txBody>
+          <a:bodyPr/>
+          <a:lstStyle/>
+          <a:p>
+            <a:r>
+              <a:rPr lang="en-AU" b="1" dirty="0"/>
+              <a:t>Vision Transformers – A potential solution?</a:t>
+            </a:r>
+            <a:endParaRPr lang="en-US" dirty="0"/>
+          </a:p>
+        </p:txBody>
+      </p:sp>
+      <p:sp>
+        <p:nvSpPr>
+          <p:cNvPr id="3" name="Content Placeholder 2">
+            <a:extLst>
+              <a:ext uri="{FF2B5EF4-FFF2-40B4-BE49-F238E27FC236}">
+                <a16:creationId xmlns:a16="http://schemas.microsoft.com/office/drawing/2014/main" id="{A830DE98-2D96-5154-71B9-87953C9AB27E}"/>
+              </a:ext>
+            </a:extLst>
+          </p:cNvPr>
+          <p:cNvSpPr>
+            <a:spLocks noGrp="1"/>
+          </p:cNvSpPr>
+          <p:nvPr>
+            <p:ph idx="1"/>
+          </p:nvPr>
+        </p:nvSpPr>
+        <p:spPr>
+          <a:xfrm>
+            <a:off x="838200" y="3212110"/>
+            <a:ext cx="10515600" cy="3280765"/>
+          </a:xfrm>
+        </p:spPr>
+        <p:txBody>
+          <a:bodyPr/>
+          <a:lstStyle/>
+          <a:p>
+            <a:r>
+              <a:rPr lang="en-AU" b="1" dirty="0"/>
+              <a:t>Original </a:t>
+            </a:r>
+            <a:r>
+              <a:rPr lang="en-AU" b="1" dirty="0" err="1"/>
+              <a:t>ViT</a:t>
+            </a:r>
+            <a:r>
+              <a:rPr lang="en-AU" b="1" dirty="0"/>
+              <a:t> Architecture (</a:t>
+            </a:r>
+            <a:r>
+              <a:rPr lang="en-AU" b="1" dirty="0" err="1"/>
+              <a:t>Dosovitskiy</a:t>
+            </a:r>
+            <a:r>
+              <a:rPr lang="en-AU" b="1" dirty="0"/>
+              <a:t> et al., 2020)</a:t>
+            </a:r>
+          </a:p>
+          <a:p>
+            <a:r>
+              <a:rPr lang="en-AU" b="1" dirty="0"/>
+              <a:t>"An Image is Worth 16x16 Words"</a:t>
+            </a:r>
+            <a:r>
+              <a:rPr lang="en-AU" dirty="0"/>
+              <a:t>: Treats image patches like text tokens</a:t>
+            </a:r>
+          </a:p>
+          <a:p>
+            <a:r>
+              <a:rPr lang="en-AU" b="1" dirty="0"/>
+              <a:t>Transformer Architecture</a:t>
+            </a:r>
+            <a:r>
+              <a:rPr lang="en-AU" dirty="0"/>
+              <a:t>: Applied directly to vision tasks for first time</a:t>
+            </a:r>
+          </a:p>
+          <a:p>
+            <a:r>
+              <a:rPr lang="en-AU" b="1" dirty="0"/>
+              <a:t>Self-Attention</a:t>
+            </a:r>
+            <a:r>
+              <a:rPr lang="en-AU" dirty="0"/>
+              <a:t>: Global understanding without convolutional inductive bias</a:t>
+            </a:r>
+          </a:p>
+        </p:txBody>
+      </p:sp>
+      <p:pic>
+        <p:nvPicPr>
+          <p:cNvPr id="12" name="Picture 11">
+            <a:extLst>
+              <a:ext uri="{FF2B5EF4-FFF2-40B4-BE49-F238E27FC236}">
+                <a16:creationId xmlns:a16="http://schemas.microsoft.com/office/drawing/2014/main" id="{FF0EB3A8-9442-C4A8-8A66-1E892A7DE55A}"/>
+              </a:ext>
+            </a:extLst>
+          </p:cNvPr>
+          <p:cNvPicPr>
+            <a:picLocks noChangeAspect="1"/>
+          </p:cNvPicPr>
+          <p:nvPr/>
+        </p:nvPicPr>
+        <p:blipFill>
+          <a:blip r:embed="rId2"/>
+          <a:stretch>
+            <a:fillRect/>
+          </a:stretch>
+        </p:blipFill>
+        <p:spPr>
+          <a:xfrm>
+            <a:off x="1569896" y="1505148"/>
+            <a:ext cx="8747996" cy="1519260"/>
+          </a:xfrm>
+          <a:prstGeom prst="rect">
+            <a:avLst/>
+          </a:prstGeom>
+        </p:spPr>
+      </p:pic>
+    </p:spTree>
+    <p:extLst>
+      <p:ext uri="{BB962C8B-B14F-4D97-AF65-F5344CB8AC3E}">
+        <p14:creationId xmlns:p14="http://schemas.microsoft.com/office/powerpoint/2010/main" val="2182484467"/>
+      </p:ext>
+    </p:extLst>
+  </p:cSld>
+  <p:clrMapOvr>
+    <a:masterClrMapping/>
+  </p:clrMapOvr>
+</p:sld>
+</file>
+
+<file path=ppt/slides/slide11.xml><?xml version="1.0" encoding="utf-8"?>
+<p:sld xmlns:a="http://schemas.openxmlformats.org/drawingml/2006/main" xmlns:r="http://schemas.openxmlformats.org/officeDocument/2006/relationships" xmlns:p="http://schemas.openxmlformats.org/presentationml/2006/main">
+  <p:cSld>
+    <p:spTree>
+      <p:nvGrpSpPr>
+        <p:cNvPr id="1" name=""/>
+        <p:cNvGrpSpPr/>
+        <p:nvPr/>
+      </p:nvGrpSpPr>
+      <p:grpSpPr>
+        <a:xfrm>
+          <a:off x="0" y="0"/>
+          <a:ext cx="0" cy="0"/>
+          <a:chOff x="0" y="0"/>
+          <a:chExt cx="0" cy="0"/>
+        </a:xfrm>
+      </p:grpSpPr>
+      <p:sp>
+        <p:nvSpPr>
+          <p:cNvPr id="2" name="Title 1">
+            <a:extLst>
+              <a:ext uri="{FF2B5EF4-FFF2-40B4-BE49-F238E27FC236}">
                 <a16:creationId xmlns:a16="http://schemas.microsoft.com/office/drawing/2014/main" id="{FC809921-A04C-4212-6435-0F09B8AC9692}"/>
               </a:ext>
             </a:extLst>
@@ -3761,7 +3930,7 @@
 </p:sld>
 </file>
 
-<file path=ppt/slides/slide11.xml><?xml version="1.0" encoding="utf-8"?>
+<file path=ppt/slides/slide12.xml><?xml version="1.0" encoding="utf-8"?>
 <p:sld xmlns:a="http://schemas.openxmlformats.org/drawingml/2006/main" xmlns:r="http://schemas.openxmlformats.org/officeDocument/2006/relationships" xmlns:p="http://schemas.openxmlformats.org/presentationml/2006/main">
   <p:cSld>
     <p:spTree>
@@ -3894,7 +4063,7 @@
 </p:sld>
 </file>
 
-<file path=ppt/slides/slide12.xml><?xml version="1.0" encoding="utf-8"?>
+<file path=ppt/slides/slide13.xml><?xml version="1.0" encoding="utf-8"?>
 <p:sld xmlns:a="http://schemas.openxmlformats.org/drawingml/2006/main" xmlns:r="http://schemas.openxmlformats.org/officeDocument/2006/relationships" xmlns:p="http://schemas.openxmlformats.org/presentationml/2006/main">
   <p:cSld>
     <p:spTree>
@@ -4020,7 +4189,7 @@
 </p:sld>
 </file>
 
-<file path=ppt/slides/slide13.xml><?xml version="1.0" encoding="utf-8"?>
+<file path=ppt/slides/slide14.xml><?xml version="1.0" encoding="utf-8"?>
 <p:sld xmlns:a="http://schemas.openxmlformats.org/drawingml/2006/main" xmlns:r="http://schemas.openxmlformats.org/officeDocument/2006/relationships" xmlns:p="http://schemas.openxmlformats.org/presentationml/2006/main">
   <p:cSld>
     <p:spTree>
@@ -4151,7 +4320,7 @@
 </p:sld>
 </file>
 
-<file path=ppt/slides/slide14.xml><?xml version="1.0" encoding="utf-8"?>
+<file path=ppt/slides/slide15.xml><?xml version="1.0" encoding="utf-8"?>
 <p:sld xmlns:a="http://schemas.openxmlformats.org/drawingml/2006/main" xmlns:r="http://schemas.openxmlformats.org/officeDocument/2006/relationships" xmlns:p="http://schemas.openxmlformats.org/presentationml/2006/main">
   <p:cSld>
     <p:spTree>
@@ -4341,7 +4510,7 @@
 </p:sld>
 </file>
 
-<file path=ppt/slides/slide15.xml><?xml version="1.0" encoding="utf-8"?>
+<file path=ppt/slides/slide16.xml><?xml version="1.0" encoding="utf-8"?>
 <p:sld xmlns:a="http://schemas.openxmlformats.org/drawingml/2006/main" xmlns:r="http://schemas.openxmlformats.org/officeDocument/2006/relationships" xmlns:p="http://schemas.openxmlformats.org/presentationml/2006/main">
   <p:cSld>
     <p:spTree>
@@ -6023,13 +6192,8 @@
             </a:r>
             <a:r>
               <a:rPr lang="en-US" dirty="0"/>
-              <a:t> IE </a:t>
-            </a:r>
-            <a:r>
-              <a:rPr lang="en-US"/>
-              <a:t>approach above</a:t>
-            </a:r>
-            <a:endParaRPr lang="en-US" dirty="0"/>
+              <a:t> IE approach above</a:t>
+            </a:r>
           </a:p>
         </p:txBody>
       </p:sp>
@@ -6131,7 +6295,7 @@
           <p:cNvPr id="2" name="Title 1">
             <a:extLst>
               <a:ext uri="{FF2B5EF4-FFF2-40B4-BE49-F238E27FC236}">
-                <a16:creationId xmlns:a16="http://schemas.microsoft.com/office/drawing/2014/main" id="{80214080-79D0-E287-0371-7509715FD53E}"/>
+                <a16:creationId xmlns:a16="http://schemas.microsoft.com/office/drawing/2014/main" id="{DAC31F10-8C36-5C9E-E266-372729D2D159}"/>
               </a:ext>
             </a:extLst>
           </p:cNvPr>
@@ -6140,113 +6304,43 @@
           </p:cNvSpPr>
           <p:nvPr>
             <p:ph type="title"/>
-          </p:nvPr>
-        </p:nvSpPr>
-        <p:spPr/>
-        <p:txBody>
-          <a:bodyPr/>
-          <a:lstStyle/>
-          <a:p>
-            <a:r>
-              <a:rPr lang="en-AU" b="1" dirty="0"/>
-              <a:t>Vision Transformers – A potential solution?</a:t>
-            </a:r>
-            <a:endParaRPr lang="en-US" dirty="0"/>
-          </a:p>
-        </p:txBody>
-      </p:sp>
-      <p:sp>
-        <p:nvSpPr>
-          <p:cNvPr id="3" name="Content Placeholder 2">
-            <a:extLst>
-              <a:ext uri="{FF2B5EF4-FFF2-40B4-BE49-F238E27FC236}">
-                <a16:creationId xmlns:a16="http://schemas.microsoft.com/office/drawing/2014/main" id="{A830DE98-2D96-5154-71B9-87953C9AB27E}"/>
-              </a:ext>
-            </a:extLst>
-          </p:cNvPr>
-          <p:cNvSpPr>
-            <a:spLocks noGrp="1"/>
-          </p:cNvSpPr>
-          <p:nvPr>
-            <p:ph idx="1"/>
           </p:nvPr>
         </p:nvSpPr>
         <p:spPr>
           <a:xfrm>
-            <a:off x="838200" y="3212110"/>
-            <a:ext cx="10515600" cy="3280765"/>
+            <a:off x="838200" y="365125"/>
+            <a:ext cx="10515600" cy="721803"/>
           </a:xfrm>
         </p:spPr>
         <p:txBody>
-          <a:bodyPr/>
-          <a:lstStyle/>
-          <a:p>
-            <a:r>
-              <a:rPr lang="en-AU" b="1" dirty="0"/>
-              <a:t>Original </a:t>
-            </a:r>
-            <a:r>
-              <a:rPr lang="en-AU" b="1" dirty="0" err="1"/>
-              <a:t>ViT</a:t>
-            </a:r>
-            <a:r>
-              <a:rPr lang="en-AU" b="1" dirty="0"/>
-              <a:t> Architecture (</a:t>
-            </a:r>
-            <a:r>
-              <a:rPr lang="en-AU" b="1" dirty="0" err="1"/>
-              <a:t>Dosovitskiy</a:t>
-            </a:r>
-            <a:r>
-              <a:rPr lang="en-AU" b="1" dirty="0"/>
-              <a:t> et al., 2020)</a:t>
-            </a:r>
-          </a:p>
-          <a:p>
-            <a:r>
-              <a:rPr lang="en-AU" b="1" dirty="0"/>
-              <a:t>"An Image is Worth 16x16 Words"</a:t>
-            </a:r>
-            <a:r>
-              <a:rPr lang="en-AU" dirty="0"/>
-              <a:t>: Treats image patches like text tokens</a:t>
-            </a:r>
-          </a:p>
-          <a:p>
-            <a:r>
-              <a:rPr lang="en-AU" b="1" dirty="0"/>
-              <a:t>Transformer Architecture</a:t>
-            </a:r>
-            <a:r>
-              <a:rPr lang="en-AU" dirty="0"/>
-              <a:t>: Applied directly to vision tasks for first time</a:t>
-            </a:r>
-          </a:p>
-          <a:p>
-            <a:r>
-              <a:rPr lang="en-AU" b="1" dirty="0"/>
-              <a:t>Self-Attention</a:t>
-            </a:r>
-            <a:r>
-              <a:rPr lang="en-AU" dirty="0"/>
-              <a:t>: Global understanding without convolutional inductive bias</a:t>
-            </a:r>
+          <a:bodyPr>
+            <a:normAutofit/>
+          </a:bodyPr>
+          <a:lstStyle/>
+          <a:p>
+            <a:r>
+              <a:rPr lang="en-AU" sz="4000" b="1" dirty="0"/>
+              <a:t>From Text to Vision - The Transformer Evolution</a:t>
+            </a:r>
+            <a:endParaRPr lang="en-US" sz="4000" dirty="0"/>
           </a:p>
         </p:txBody>
       </p:sp>
       <p:pic>
         <p:nvPicPr>
-          <p:cNvPr id="12" name="Picture 11">
-            <a:extLst>
-              <a:ext uri="{FF2B5EF4-FFF2-40B4-BE49-F238E27FC236}">
-                <a16:creationId xmlns:a16="http://schemas.microsoft.com/office/drawing/2014/main" id="{FF0EB3A8-9442-C4A8-8A66-1E892A7DE55A}"/>
+          <p:cNvPr id="5" name="Content Placeholder 4" descr="A diagram of a work flow&#10;&#10;AI-generated content may be incorrect.">
+            <a:extLst>
+              <a:ext uri="{FF2B5EF4-FFF2-40B4-BE49-F238E27FC236}">
+                <a16:creationId xmlns:a16="http://schemas.microsoft.com/office/drawing/2014/main" id="{72C03810-E30E-F066-FF7B-67044895554B}"/>
               </a:ext>
             </a:extLst>
           </p:cNvPr>
           <p:cNvPicPr>
-            <a:picLocks noChangeAspect="1"/>
+            <a:picLocks noGrp="1" noChangeAspect="1"/>
           </p:cNvPicPr>
-          <p:nvPr/>
+          <p:nvPr>
+            <p:ph idx="1"/>
+          </p:nvPr>
         </p:nvPicPr>
         <p:blipFill>
           <a:blip r:embed="rId2"/>
@@ -6256,18 +6350,133 @@
         </p:blipFill>
         <p:spPr>
           <a:xfrm>
-            <a:off x="1569896" y="1505148"/>
-            <a:ext cx="8747996" cy="1519260"/>
+            <a:off x="760562" y="1181439"/>
+            <a:ext cx="10515600" cy="4000691"/>
+          </a:xfrm>
+        </p:spPr>
+      </p:pic>
+      <p:sp>
+        <p:nvSpPr>
+          <p:cNvPr id="6" name="TextBox 5">
+            <a:extLst>
+              <a:ext uri="{FF2B5EF4-FFF2-40B4-BE49-F238E27FC236}">
+                <a16:creationId xmlns:a16="http://schemas.microsoft.com/office/drawing/2014/main" id="{35EE4B8D-ED86-07C7-DBF3-0517246599F0}"/>
+              </a:ext>
+            </a:extLst>
+          </p:cNvPr>
+          <p:cNvSpPr txBox="1"/>
+          <p:nvPr/>
+        </p:nvSpPr>
+        <p:spPr>
+          <a:xfrm>
+            <a:off x="760562" y="3429000"/>
+            <a:ext cx="8980714" cy="2308324"/>
           </a:xfrm>
           <a:prstGeom prst="rect">
             <a:avLst/>
           </a:prstGeom>
+          <a:noFill/>
         </p:spPr>
-      </p:pic>
+        <p:txBody>
+          <a:bodyPr wrap="square" rtlCol="0">
+            <a:spAutoFit/>
+          </a:bodyPr>
+          <a:lstStyle/>
+          <a:p>
+            <a:r>
+              <a:rPr lang="en-AU" b="1" dirty="0"/>
+              <a:t>The Revolutionary Insight</a:t>
+            </a:r>
+            <a:r>
+              <a:rPr lang="en-AU" dirty="0"/>
+              <a:t>: </a:t>
+            </a:r>
+            <a:r>
+              <a:rPr lang="en-AU" i="1" dirty="0"/>
+              <a:t>Same core architecture, different input</a:t>
+            </a:r>
+            <a:endParaRPr lang="en-AU" dirty="0"/>
+          </a:p>
+          <a:p>
+            <a:r>
+              <a:rPr lang="en-AU" b="1" dirty="0"/>
+              <a:t>What You Already Know</a:t>
+            </a:r>
+            <a:r>
+              <a:rPr lang="en-AU" dirty="0"/>
+              <a:t> (Text Transformers 2017):</a:t>
+            </a:r>
+          </a:p>
+          <a:p>
+            <a:pPr marL="285750" indent="-285750">
+              <a:buFont typeface="Arial" panose="020B0604020202020204" pitchFamily="34" charset="0"/>
+              <a:buChar char="•"/>
+            </a:pPr>
+            <a:r>
+              <a:rPr lang="en-AU" dirty="0"/>
+              <a:t>Tokenization → Self-Attention → Understanding</a:t>
+            </a:r>
+          </a:p>
+          <a:p>
+            <a:pPr marL="285750" indent="-285750">
+              <a:buFont typeface="Arial" panose="020B0604020202020204" pitchFamily="34" charset="0"/>
+              <a:buChar char="•"/>
+            </a:pPr>
+            <a:r>
+              <a:rPr lang="en-AU" dirty="0"/>
+              <a:t>"Attention is All You Need" revolutionized NLP</a:t>
+            </a:r>
+          </a:p>
+          <a:p>
+            <a:r>
+              <a:rPr lang="en-AU" b="1" dirty="0"/>
+              <a:t>The Vision Breakthrough</a:t>
+            </a:r>
+            <a:r>
+              <a:rPr lang="en-AU" dirty="0"/>
+              <a:t> (2020):</a:t>
+            </a:r>
+          </a:p>
+          <a:p>
+            <a:pPr marL="285750" indent="-285750">
+              <a:buFont typeface="Arial" panose="020B0604020202020204" pitchFamily="34" charset="0"/>
+              <a:buChar char="•"/>
+            </a:pPr>
+            <a:r>
+              <a:rPr lang="en-AU" dirty="0"/>
+              <a:t>Image patches = Text tokens</a:t>
+            </a:r>
+          </a:p>
+          <a:p>
+            <a:pPr marL="285750" indent="-285750">
+              <a:buFont typeface="Arial" panose="020B0604020202020204" pitchFamily="34" charset="0"/>
+              <a:buChar char="•"/>
+            </a:pPr>
+            <a:r>
+              <a:rPr lang="en-AU" b="1" dirty="0"/>
+              <a:t>IDENTICAL</a:t>
+            </a:r>
+            <a:r>
+              <a:rPr lang="en-AU" dirty="0"/>
+              <a:t> self-attention architecture</a:t>
+            </a:r>
+          </a:p>
+          <a:p>
+            <a:pPr marL="285750" indent="-285750">
+              <a:buFont typeface="Arial" panose="020B0604020202020204" pitchFamily="34" charset="0"/>
+              <a:buChar char="•"/>
+            </a:pPr>
+            <a:r>
+              <a:rPr lang="en-AU" dirty="0"/>
+              <a:t>Vision-Language fusion for document understanding</a:t>
+            </a:r>
+          </a:p>
+        </p:txBody>
+      </p:sp>
     </p:spTree>
     <p:extLst>
       <p:ext uri="{BB962C8B-B14F-4D97-AF65-F5344CB8AC3E}">
-        <p14:creationId xmlns:p14="http://schemas.microsoft.com/office/powerpoint/2010/main" val="2182484467"/>
+        <p14:creationId xmlns:p14="http://schemas.microsoft.com/office/powerpoint/2010/main" val="825754891"/>
       </p:ext>
     </p:extLst>
   </p:cSld>

</xml_diff>

<commit_message>
✨ feat: enhance speaker notes for self-attention in tax document processing with detailed examples and attention weights
</commit_message>
<xml_diff>
--- a/presentation_materials/vision_transformers.pptx
+++ b/presentation_materials/vision_transformers.pptx
@@ -14263,544 +14263,6 @@
   <p:clrMapOvr>
     <a:masterClrMapping/>
   </p:clrMapOvr>
-  <p:timing>
-    <p:tnLst>
-      <p:par>
-        <p:cTn id="1" dur="indefinite" restart="never" nodeType="tmRoot">
-          <p:childTnLst>
-            <p:seq concurrent="1" nextAc="seek">
-              <p:cTn id="2" dur="indefinite" nodeType="mainSeq">
-                <p:childTnLst>
-                  <p:par>
-                    <p:cTn id="3" fill="hold">
-                      <p:stCondLst>
-                        <p:cond delay="indefinite"/>
-                      </p:stCondLst>
-                      <p:childTnLst>
-                        <p:par>
-                          <p:cTn id="4" fill="hold">
-                            <p:stCondLst>
-                              <p:cond delay="0"/>
-                            </p:stCondLst>
-                            <p:childTnLst>
-                              <p:par>
-                                <p:cTn id="5" presetID="1" presetClass="entr" presetSubtype="0" fill="hold" grpId="0" nodeType="clickEffect">
-                                  <p:stCondLst>
-                                    <p:cond delay="0"/>
-                                  </p:stCondLst>
-                                  <p:childTnLst>
-                                    <p:set>
-                                      <p:cBhvr>
-                                        <p:cTn id="6" dur="1" fill="hold">
-                                          <p:stCondLst>
-                                            <p:cond delay="0"/>
-                                          </p:stCondLst>
-                                        </p:cTn>
-                                        <p:tgtEl>
-                                          <p:spTgt spid="6"/>
-                                        </p:tgtEl>
-                                        <p:attrNameLst>
-                                          <p:attrName>style.visibility</p:attrName>
-                                        </p:attrNameLst>
-                                      </p:cBhvr>
-                                      <p:to>
-                                        <p:strVal val="visible"/>
-                                      </p:to>
-                                    </p:set>
-                                  </p:childTnLst>
-                                </p:cTn>
-                              </p:par>
-                            </p:childTnLst>
-                          </p:cTn>
-                        </p:par>
-                      </p:childTnLst>
-                    </p:cTn>
-                  </p:par>
-                  <p:par>
-                    <p:cTn id="7" fill="hold">
-                      <p:stCondLst>
-                        <p:cond delay="indefinite"/>
-                      </p:stCondLst>
-                      <p:childTnLst>
-                        <p:par>
-                          <p:cTn id="8" fill="hold">
-                            <p:stCondLst>
-                              <p:cond delay="0"/>
-                            </p:stCondLst>
-                            <p:childTnLst>
-                              <p:par>
-                                <p:cTn id="9" presetID="1" presetClass="entr" presetSubtype="0" fill="hold" grpId="1" nodeType="clickEffect">
-                                  <p:stCondLst>
-                                    <p:cond delay="0"/>
-                                  </p:stCondLst>
-                                  <p:childTnLst>
-                                    <p:set>
-                                      <p:cBhvr>
-                                        <p:cTn id="10" dur="1" fill="hold">
-                                          <p:stCondLst>
-                                            <p:cond delay="0"/>
-                                          </p:stCondLst>
-                                        </p:cTn>
-                                        <p:tgtEl>
-                                          <p:spTgt spid="6"/>
-                                        </p:tgtEl>
-                                        <p:attrNameLst>
-                                          <p:attrName>style.visibility</p:attrName>
-                                        </p:attrNameLst>
-                                      </p:cBhvr>
-                                      <p:to>
-                                        <p:strVal val="visible"/>
-                                      </p:to>
-                                    </p:set>
-                                  </p:childTnLst>
-                                </p:cTn>
-                              </p:par>
-                            </p:childTnLst>
-                          </p:cTn>
-                        </p:par>
-                      </p:childTnLst>
-                    </p:cTn>
-                  </p:par>
-                  <p:par>
-                    <p:cTn id="11" fill="hold">
-                      <p:stCondLst>
-                        <p:cond delay="indefinite"/>
-                      </p:stCondLst>
-                      <p:childTnLst>
-                        <p:par>
-                          <p:cTn id="12" fill="hold">
-                            <p:stCondLst>
-                              <p:cond delay="0"/>
-                            </p:stCondLst>
-                            <p:childTnLst>
-                              <p:par>
-                                <p:cTn id="13" presetID="1" presetClass="entr" presetSubtype="0" fill="hold" grpId="2" nodeType="clickEffect">
-                                  <p:stCondLst>
-                                    <p:cond delay="0"/>
-                                  </p:stCondLst>
-                                  <p:childTnLst>
-                                    <p:set>
-                                      <p:cBhvr>
-                                        <p:cTn id="14" dur="1" fill="hold">
-                                          <p:stCondLst>
-                                            <p:cond delay="0"/>
-                                          </p:stCondLst>
-                                        </p:cTn>
-                                        <p:tgtEl>
-                                          <p:spTgt spid="6"/>
-                                        </p:tgtEl>
-                                        <p:attrNameLst>
-                                          <p:attrName>style.visibility</p:attrName>
-                                        </p:attrNameLst>
-                                      </p:cBhvr>
-                                      <p:to>
-                                        <p:strVal val="visible"/>
-                                      </p:to>
-                                    </p:set>
-                                  </p:childTnLst>
-                                </p:cTn>
-                              </p:par>
-                            </p:childTnLst>
-                          </p:cTn>
-                        </p:par>
-                      </p:childTnLst>
-                    </p:cTn>
-                  </p:par>
-                  <p:par>
-                    <p:cTn id="15" fill="hold">
-                      <p:stCondLst>
-                        <p:cond delay="indefinite"/>
-                      </p:stCondLst>
-                      <p:childTnLst>
-                        <p:par>
-                          <p:cTn id="16" fill="hold">
-                            <p:stCondLst>
-                              <p:cond delay="0"/>
-                            </p:stCondLst>
-                            <p:childTnLst>
-                              <p:par>
-                                <p:cTn id="17" presetID="1" presetClass="entr" presetSubtype="0" fill="hold" grpId="3" nodeType="clickEffect">
-                                  <p:stCondLst>
-                                    <p:cond delay="0"/>
-                                  </p:stCondLst>
-                                  <p:childTnLst>
-                                    <p:set>
-                                      <p:cBhvr>
-                                        <p:cTn id="18" dur="1" fill="hold">
-                                          <p:stCondLst>
-                                            <p:cond delay="0"/>
-                                          </p:stCondLst>
-                                        </p:cTn>
-                                        <p:tgtEl>
-                                          <p:spTgt spid="6"/>
-                                        </p:tgtEl>
-                                        <p:attrNameLst>
-                                          <p:attrName>style.visibility</p:attrName>
-                                        </p:attrNameLst>
-                                      </p:cBhvr>
-                                      <p:to>
-                                        <p:strVal val="visible"/>
-                                      </p:to>
-                                    </p:set>
-                                  </p:childTnLst>
-                                </p:cTn>
-                              </p:par>
-                            </p:childTnLst>
-                          </p:cTn>
-                        </p:par>
-                      </p:childTnLst>
-                    </p:cTn>
-                  </p:par>
-                  <p:par>
-                    <p:cTn id="19" fill="hold">
-                      <p:stCondLst>
-                        <p:cond delay="indefinite"/>
-                      </p:stCondLst>
-                      <p:childTnLst>
-                        <p:par>
-                          <p:cTn id="20" fill="hold">
-                            <p:stCondLst>
-                              <p:cond delay="0"/>
-                            </p:stCondLst>
-                            <p:childTnLst>
-                              <p:par>
-                                <p:cTn id="21" presetID="1" presetClass="entr" presetSubtype="0" fill="hold" grpId="4" nodeType="clickEffect">
-                                  <p:stCondLst>
-                                    <p:cond delay="0"/>
-                                  </p:stCondLst>
-                                  <p:childTnLst>
-                                    <p:set>
-                                      <p:cBhvr>
-                                        <p:cTn id="22" dur="1" fill="hold">
-                                          <p:stCondLst>
-                                            <p:cond delay="0"/>
-                                          </p:stCondLst>
-                                        </p:cTn>
-                                        <p:tgtEl>
-                                          <p:spTgt spid="6"/>
-                                        </p:tgtEl>
-                                        <p:attrNameLst>
-                                          <p:attrName>style.visibility</p:attrName>
-                                        </p:attrNameLst>
-                                      </p:cBhvr>
-                                      <p:to>
-                                        <p:strVal val="visible"/>
-                                      </p:to>
-                                    </p:set>
-                                  </p:childTnLst>
-                                </p:cTn>
-                              </p:par>
-                            </p:childTnLst>
-                          </p:cTn>
-                        </p:par>
-                      </p:childTnLst>
-                    </p:cTn>
-                  </p:par>
-                  <p:par>
-                    <p:cTn id="23" fill="hold">
-                      <p:stCondLst>
-                        <p:cond delay="indefinite"/>
-                      </p:stCondLst>
-                      <p:childTnLst>
-                        <p:par>
-                          <p:cTn id="24" fill="hold">
-                            <p:stCondLst>
-                              <p:cond delay="0"/>
-                            </p:stCondLst>
-                            <p:childTnLst>
-                              <p:par>
-                                <p:cTn id="25" presetID="1" presetClass="entr" presetSubtype="0" fill="hold" grpId="5" nodeType="clickEffect">
-                                  <p:stCondLst>
-                                    <p:cond delay="0"/>
-                                  </p:stCondLst>
-                                  <p:childTnLst>
-                                    <p:set>
-                                      <p:cBhvr>
-                                        <p:cTn id="26" dur="1" fill="hold">
-                                          <p:stCondLst>
-                                            <p:cond delay="0"/>
-                                          </p:stCondLst>
-                                        </p:cTn>
-                                        <p:tgtEl>
-                                          <p:spTgt spid="6"/>
-                                        </p:tgtEl>
-                                        <p:attrNameLst>
-                                          <p:attrName>style.visibility</p:attrName>
-                                        </p:attrNameLst>
-                                      </p:cBhvr>
-                                      <p:to>
-                                        <p:strVal val="visible"/>
-                                      </p:to>
-                                    </p:set>
-                                  </p:childTnLst>
-                                </p:cTn>
-                              </p:par>
-                            </p:childTnLst>
-                          </p:cTn>
-                        </p:par>
-                      </p:childTnLst>
-                    </p:cTn>
-                  </p:par>
-                  <p:par>
-                    <p:cTn id="27" fill="hold">
-                      <p:stCondLst>
-                        <p:cond delay="indefinite"/>
-                      </p:stCondLst>
-                      <p:childTnLst>
-                        <p:par>
-                          <p:cTn id="28" fill="hold">
-                            <p:stCondLst>
-                              <p:cond delay="0"/>
-                            </p:stCondLst>
-                            <p:childTnLst>
-                              <p:par>
-                                <p:cTn id="29" presetID="1" presetClass="entr" presetSubtype="0" fill="hold" grpId="6" nodeType="clickEffect">
-                                  <p:stCondLst>
-                                    <p:cond delay="0"/>
-                                  </p:stCondLst>
-                                  <p:childTnLst>
-                                    <p:set>
-                                      <p:cBhvr>
-                                        <p:cTn id="30" dur="1" fill="hold">
-                                          <p:stCondLst>
-                                            <p:cond delay="0"/>
-                                          </p:stCondLst>
-                                        </p:cTn>
-                                        <p:tgtEl>
-                                          <p:spTgt spid="6"/>
-                                        </p:tgtEl>
-                                        <p:attrNameLst>
-                                          <p:attrName>style.visibility</p:attrName>
-                                        </p:attrNameLst>
-                                      </p:cBhvr>
-                                      <p:to>
-                                        <p:strVal val="visible"/>
-                                      </p:to>
-                                    </p:set>
-                                  </p:childTnLst>
-                                </p:cTn>
-                              </p:par>
-                            </p:childTnLst>
-                          </p:cTn>
-                        </p:par>
-                      </p:childTnLst>
-                    </p:cTn>
-                  </p:par>
-                  <p:par>
-                    <p:cTn id="31" fill="hold">
-                      <p:stCondLst>
-                        <p:cond delay="indefinite"/>
-                      </p:stCondLst>
-                      <p:childTnLst>
-                        <p:par>
-                          <p:cTn id="32" fill="hold">
-                            <p:stCondLst>
-                              <p:cond delay="0"/>
-                            </p:stCondLst>
-                            <p:childTnLst>
-                              <p:par>
-                                <p:cTn id="33" presetID="1" presetClass="entr" presetSubtype="0" fill="hold" grpId="7" nodeType="clickEffect">
-                                  <p:stCondLst>
-                                    <p:cond delay="0"/>
-                                  </p:stCondLst>
-                                  <p:childTnLst>
-                                    <p:set>
-                                      <p:cBhvr>
-                                        <p:cTn id="34" dur="1" fill="hold">
-                                          <p:stCondLst>
-                                            <p:cond delay="0"/>
-                                          </p:stCondLst>
-                                        </p:cTn>
-                                        <p:tgtEl>
-                                          <p:spTgt spid="6"/>
-                                        </p:tgtEl>
-                                        <p:attrNameLst>
-                                          <p:attrName>style.visibility</p:attrName>
-                                        </p:attrNameLst>
-                                      </p:cBhvr>
-                                      <p:to>
-                                        <p:strVal val="visible"/>
-                                      </p:to>
-                                    </p:set>
-                                  </p:childTnLst>
-                                </p:cTn>
-                              </p:par>
-                            </p:childTnLst>
-                          </p:cTn>
-                        </p:par>
-                      </p:childTnLst>
-                    </p:cTn>
-                  </p:par>
-                  <p:par>
-                    <p:cTn id="35" fill="hold">
-                      <p:stCondLst>
-                        <p:cond delay="indefinite"/>
-                      </p:stCondLst>
-                      <p:childTnLst>
-                        <p:par>
-                          <p:cTn id="36" fill="hold">
-                            <p:stCondLst>
-                              <p:cond delay="0"/>
-                            </p:stCondLst>
-                            <p:childTnLst>
-                              <p:par>
-                                <p:cTn id="37" presetID="1" presetClass="entr" presetSubtype="0" fill="hold" grpId="8" nodeType="clickEffect">
-                                  <p:stCondLst>
-                                    <p:cond delay="0"/>
-                                  </p:stCondLst>
-                                  <p:childTnLst>
-                                    <p:set>
-                                      <p:cBhvr>
-                                        <p:cTn id="38" dur="1" fill="hold">
-                                          <p:stCondLst>
-                                            <p:cond delay="0"/>
-                                          </p:stCondLst>
-                                        </p:cTn>
-                                        <p:tgtEl>
-                                          <p:spTgt spid="6"/>
-                                        </p:tgtEl>
-                                        <p:attrNameLst>
-                                          <p:attrName>style.visibility</p:attrName>
-                                        </p:attrNameLst>
-                                      </p:cBhvr>
-                                      <p:to>
-                                        <p:strVal val="visible"/>
-                                      </p:to>
-                                    </p:set>
-                                  </p:childTnLst>
-                                </p:cTn>
-                              </p:par>
-                            </p:childTnLst>
-                          </p:cTn>
-                        </p:par>
-                      </p:childTnLst>
-                    </p:cTn>
-                  </p:par>
-                  <p:par>
-                    <p:cTn id="39" fill="hold">
-                      <p:stCondLst>
-                        <p:cond delay="indefinite"/>
-                      </p:stCondLst>
-                      <p:childTnLst>
-                        <p:par>
-                          <p:cTn id="40" fill="hold">
-                            <p:stCondLst>
-                              <p:cond delay="0"/>
-                            </p:stCondLst>
-                            <p:childTnLst>
-                              <p:par>
-                                <p:cTn id="41" presetID="1" presetClass="entr" presetSubtype="0" fill="hold" grpId="9" nodeType="clickEffect">
-                                  <p:stCondLst>
-                                    <p:cond delay="0"/>
-                                  </p:stCondLst>
-                                  <p:childTnLst>
-                                    <p:set>
-                                      <p:cBhvr>
-                                        <p:cTn id="42" dur="1" fill="hold">
-                                          <p:stCondLst>
-                                            <p:cond delay="0"/>
-                                          </p:stCondLst>
-                                        </p:cTn>
-                                        <p:tgtEl>
-                                          <p:spTgt spid="6"/>
-                                        </p:tgtEl>
-                                        <p:attrNameLst>
-                                          <p:attrName>style.visibility</p:attrName>
-                                        </p:attrNameLst>
-                                      </p:cBhvr>
-                                      <p:to>
-                                        <p:strVal val="visible"/>
-                                      </p:to>
-                                    </p:set>
-                                  </p:childTnLst>
-                                </p:cTn>
-                              </p:par>
-                            </p:childTnLst>
-                          </p:cTn>
-                        </p:par>
-                      </p:childTnLst>
-                    </p:cTn>
-                  </p:par>
-                  <p:par>
-                    <p:cTn id="43" fill="hold">
-                      <p:stCondLst>
-                        <p:cond delay="indefinite"/>
-                      </p:stCondLst>
-                      <p:childTnLst>
-                        <p:par>
-                          <p:cTn id="44" fill="hold">
-                            <p:stCondLst>
-                              <p:cond delay="0"/>
-                            </p:stCondLst>
-                            <p:childTnLst>
-                              <p:par>
-                                <p:cTn id="45" presetID="1" presetClass="entr" presetSubtype="0" fill="hold" grpId="10" nodeType="clickEffect">
-                                  <p:stCondLst>
-                                    <p:cond delay="0"/>
-                                  </p:stCondLst>
-                                  <p:childTnLst>
-                                    <p:set>
-                                      <p:cBhvr>
-                                        <p:cTn id="46" dur="1" fill="hold">
-                                          <p:stCondLst>
-                                            <p:cond delay="0"/>
-                                          </p:stCondLst>
-                                        </p:cTn>
-                                        <p:tgtEl>
-                                          <p:spTgt spid="6"/>
-                                        </p:tgtEl>
-                                        <p:attrNameLst>
-                                          <p:attrName>style.visibility</p:attrName>
-                                        </p:attrNameLst>
-                                      </p:cBhvr>
-                                      <p:to>
-                                        <p:strVal val="visible"/>
-                                      </p:to>
-                                    </p:set>
-                                  </p:childTnLst>
-                                </p:cTn>
-                              </p:par>
-                            </p:childTnLst>
-                          </p:cTn>
-                        </p:par>
-                      </p:childTnLst>
-                    </p:cTn>
-                  </p:par>
-                </p:childTnLst>
-              </p:cTn>
-              <p:prevCondLst>
-                <p:cond evt="onPrev" delay="0">
-                  <p:tgtEl>
-                    <p:sldTgt/>
-                  </p:tgtEl>
-                </p:cond>
-              </p:prevCondLst>
-              <p:nextCondLst>
-                <p:cond evt="onNext" delay="0">
-                  <p:tgtEl>
-                    <p:sldTgt/>
-                  </p:tgtEl>
-                </p:cond>
-              </p:nextCondLst>
-            </p:seq>
-          </p:childTnLst>
-        </p:cTn>
-      </p:par>
-    </p:tnLst>
-    <p:bldLst>
-      <p:bldP spid="6" grpId="0"/>
-      <p:bldP spid="6" grpId="1"/>
-      <p:bldP spid="6" grpId="2"/>
-      <p:bldP spid="6" grpId="3"/>
-      <p:bldP spid="6" grpId="4"/>
-      <p:bldP spid="6" grpId="5"/>
-      <p:bldP spid="6" grpId="6"/>
-      <p:bldP spid="6" grpId="7"/>
-      <p:bldP spid="6" grpId="8"/>
-      <p:bldP spid="6" grpId="9"/>
-      <p:bldP spid="6" grpId="10"/>
-    </p:bldLst>
-  </p:timing>
 </p:sld>
 </file>
 

</xml_diff>

<commit_message>
✨ feat: update Vision Transformers presentation materials with new content and visuals
</commit_message>
<xml_diff>
--- a/presentation_materials/vision_transformers.pptx
+++ b/presentation_materials/vision_transformers.pptx
@@ -7386,8 +7386,8 @@
         </p:nvSpPr>
         <p:spPr>
           <a:xfrm>
-            <a:off x="6096000" y="882042"/>
-            <a:ext cx="5181600" cy="5892933"/>
+            <a:off x="6096000" y="1920009"/>
+            <a:ext cx="5181600" cy="2911483"/>
           </a:xfrm>
         </p:spPr>
         <p:txBody>
@@ -7396,140 +7396,45 @@
           </a:bodyPr>
           <a:lstStyle/>
           <a:p>
-            <a:pPr marL="0" indent="0">
-              <a:buNone/>
-            </a:pPr>
-            <a:r>
-              <a:rPr lang="en-AU" sz="1200" b="1" dirty="0"/>
-              <a:t>Document-Specific Attention Patterns</a:t>
-            </a:r>
-            <a:r>
-              <a:rPr lang="en-AU" sz="1200" dirty="0"/>
-              <a:t>:</a:t>
-            </a:r>
-          </a:p>
-          <a:p>
-            <a:r>
-              <a:rPr lang="en-AU" sz="1200" b="1" dirty="0"/>
-              <a:t>Supplier Identification</a:t>
-            </a:r>
-            <a:r>
-              <a:rPr lang="en-AU" sz="1200" dirty="0"/>
-              <a:t>: "Hyatt Hotels" header patches strongly attend to each other and ABN</a:t>
-            </a:r>
-          </a:p>
-          <a:p>
-            <a:r>
-              <a:rPr lang="en-AU" sz="1200" b="1" dirty="0"/>
-              <a:t>Amount Verification</a:t>
-            </a:r>
-            <a:r>
-              <a:rPr lang="en-AU" sz="1200" dirty="0"/>
-              <a:t>: "$31.33" total patches attend to line item amounts for validation</a:t>
-            </a:r>
-          </a:p>
-          <a:p>
-            <a:r>
-              <a:rPr lang="en-AU" sz="1200" b="1" dirty="0"/>
-              <a:t>GST Calculation</a:t>
-            </a:r>
-            <a:r>
-              <a:rPr lang="en-AU" sz="1200" dirty="0"/>
-              <a:t>: GST patches attend to subtotal and tax calculation components</a:t>
-            </a:r>
-          </a:p>
-          <a:p>
-            <a:r>
-              <a:rPr lang="en-AU" sz="1200" b="1" dirty="0"/>
-              <a:t>Item Relationships</a:t>
-            </a:r>
-            <a:r>
-              <a:rPr lang="en-AU" sz="1200" dirty="0"/>
-              <a:t>: Line items attend to corresponding prices and quantities</a:t>
-            </a:r>
-          </a:p>
-          <a:p>
-            <a:pPr marL="0" indent="0">
-              <a:buNone/>
-            </a:pPr>
-            <a:r>
-              <a:rPr lang="en-AU" sz="1200" b="1" dirty="0"/>
-              <a:t>Tax Compliance Applications</a:t>
-            </a:r>
-            <a:r>
-              <a:rPr lang="en-AU" sz="1200" dirty="0"/>
-              <a:t>:</a:t>
-            </a:r>
-          </a:p>
-          <a:p>
-            <a:r>
-              <a:rPr lang="en-AU" sz="1200" b="1" dirty="0"/>
-              <a:t>Cross-Validation</a:t>
-            </a:r>
-            <a:r>
-              <a:rPr lang="en-AU" sz="1200" dirty="0"/>
-              <a:t>: Total amount attention to line items enables automatic verification</a:t>
-            </a:r>
-          </a:p>
-          <a:p>
-            <a:r>
-              <a:rPr lang="en-AU" sz="1200" b="1" dirty="0"/>
-              <a:t>Supplier Validation</a:t>
-            </a:r>
-            <a:r>
-              <a:rPr lang="en-AU" sz="1200" dirty="0"/>
-              <a:t>: Business name attention to ABN confirms entity legitimacy</a:t>
-            </a:r>
-          </a:p>
-          <a:p>
-            <a:r>
-              <a:rPr lang="en-AU" sz="1200" b="1" dirty="0"/>
-              <a:t>Category Recognition</a:t>
-            </a:r>
-            <a:r>
-              <a:rPr lang="en-AU" sz="1200" dirty="0"/>
-              <a:t>: Item descriptions attend to amounts for expense classification</a:t>
-            </a:r>
-          </a:p>
-          <a:p>
-            <a:r>
-              <a:rPr lang="en-AU" sz="1200" b="1" dirty="0"/>
-              <a:t>Date Verification</a:t>
-            </a:r>
-            <a:r>
-              <a:rPr lang="en-AU" sz="1200" dirty="0"/>
-              <a:t>: Transaction date attention to supplier for temporal validation</a:t>
-            </a:r>
-          </a:p>
-          <a:p>
-            <a:pPr marL="0" indent="0">
-              <a:buNone/>
-            </a:pPr>
-            <a:r>
-              <a:rPr lang="en-AU" sz="1200" b="1" dirty="0"/>
-              <a:t>Real Example from Hyatt Hotels Receipt</a:t>
-            </a:r>
-            <a:r>
-              <a:rPr lang="en-AU" sz="1200" dirty="0"/>
-              <a:t>:</a:t>
-            </a:r>
-          </a:p>
-          <a:p>
-            <a:r>
-              <a:rPr lang="en-AU" sz="1200" dirty="0"/>
+            <a:r>
+              <a:rPr lang="en-AU" sz="1600" b="1" dirty="0"/>
+              <a:t>Real Example from Hyatt Hotels </a:t>
+            </a:r>
+            <a:r>
+              <a:rPr lang="en-AU" sz="1600" b="1" dirty="0" err="1"/>
+              <a:t>ReceiptReal</a:t>
+            </a:r>
+            <a:r>
+              <a:rPr lang="en-AU" sz="1600" b="1" dirty="0"/>
+              <a:t> Example from Hyatt Hotels Receipt</a:t>
+            </a:r>
+          </a:p>
+          <a:p>
+            <a:r>
+              <a:rPr lang="en-AU" sz="1600" dirty="0"/>
               <a:t>"TOTAL $31.33" patches attend to: Line items (0.85), GST calculation (0.78), Subtotal (0.92)</a:t>
             </a:r>
           </a:p>
           <a:p>
             <a:r>
-              <a:rPr lang="en-AU" sz="1200" dirty="0"/>
+              <a:rPr lang="en-AU" sz="1600" dirty="0"/>
               <a:t>"Hyatt Hotels" patches attend to: ABN number (0.91), Address (0.67), Logo (0.88)</a:t>
             </a:r>
           </a:p>
           <a:p>
             <a:r>
-              <a:rPr lang="en-AU" sz="1200" dirty="0"/>
+              <a:rPr lang="en-AU" sz="1600" dirty="0"/>
               <a:t>"GST $2.85" patches attend to: Subtotal $28.48 (0.94), Tax rate calculation (0.89)</a:t>
+            </a:r>
+          </a:p>
+          <a:p>
+            <a:r>
+              <a:rPr lang="en-AU" sz="1600" b="1" dirty="0"/>
+              <a:t>Key Insight</a:t>
+            </a:r>
+            <a:r>
+              <a:rPr lang="en-AU" sz="1600" dirty="0"/>
+              <a:t>: Attention naturally models tax document verification requirements</a:t>
             </a:r>
           </a:p>
         </p:txBody>
@@ -7777,447 +7682,6 @@
                                           <p:spTgt spid="4">
                                             <p:txEl>
                                               <p:pRg st="4" end="4"/>
-                                            </p:txEl>
-                                          </p:spTgt>
-                                        </p:tgtEl>
-                                        <p:attrNameLst>
-                                          <p:attrName>style.visibility</p:attrName>
-                                        </p:attrNameLst>
-                                      </p:cBhvr>
-                                      <p:to>
-                                        <p:strVal val="visible"/>
-                                      </p:to>
-                                    </p:set>
-                                  </p:childTnLst>
-                                </p:cTn>
-                              </p:par>
-                            </p:childTnLst>
-                          </p:cTn>
-                        </p:par>
-                      </p:childTnLst>
-                    </p:cTn>
-                  </p:par>
-                  <p:par>
-                    <p:cTn id="23" fill="hold">
-                      <p:stCondLst>
-                        <p:cond delay="indefinite"/>
-                      </p:stCondLst>
-                      <p:childTnLst>
-                        <p:par>
-                          <p:cTn id="24" fill="hold">
-                            <p:stCondLst>
-                              <p:cond delay="0"/>
-                            </p:stCondLst>
-                            <p:childTnLst>
-                              <p:par>
-                                <p:cTn id="25" presetID="1" presetClass="entr" presetSubtype="0" fill="hold" grpId="0" nodeType="clickEffect">
-                                  <p:stCondLst>
-                                    <p:cond delay="0"/>
-                                  </p:stCondLst>
-                                  <p:childTnLst>
-                                    <p:set>
-                                      <p:cBhvr>
-                                        <p:cTn id="26" dur="1" fill="hold">
-                                          <p:stCondLst>
-                                            <p:cond delay="0"/>
-                                          </p:stCondLst>
-                                        </p:cTn>
-                                        <p:tgtEl>
-                                          <p:spTgt spid="4">
-                                            <p:txEl>
-                                              <p:pRg st="5" end="5"/>
-                                            </p:txEl>
-                                          </p:spTgt>
-                                        </p:tgtEl>
-                                        <p:attrNameLst>
-                                          <p:attrName>style.visibility</p:attrName>
-                                        </p:attrNameLst>
-                                      </p:cBhvr>
-                                      <p:to>
-                                        <p:strVal val="visible"/>
-                                      </p:to>
-                                    </p:set>
-                                  </p:childTnLst>
-                                </p:cTn>
-                              </p:par>
-                            </p:childTnLst>
-                          </p:cTn>
-                        </p:par>
-                      </p:childTnLst>
-                    </p:cTn>
-                  </p:par>
-                  <p:par>
-                    <p:cTn id="27" fill="hold">
-                      <p:stCondLst>
-                        <p:cond delay="indefinite"/>
-                      </p:stCondLst>
-                      <p:childTnLst>
-                        <p:par>
-                          <p:cTn id="28" fill="hold">
-                            <p:stCondLst>
-                              <p:cond delay="0"/>
-                            </p:stCondLst>
-                            <p:childTnLst>
-                              <p:par>
-                                <p:cTn id="29" presetID="1" presetClass="entr" presetSubtype="0" fill="hold" grpId="0" nodeType="clickEffect">
-                                  <p:stCondLst>
-                                    <p:cond delay="0"/>
-                                  </p:stCondLst>
-                                  <p:childTnLst>
-                                    <p:set>
-                                      <p:cBhvr>
-                                        <p:cTn id="30" dur="1" fill="hold">
-                                          <p:stCondLst>
-                                            <p:cond delay="0"/>
-                                          </p:stCondLst>
-                                        </p:cTn>
-                                        <p:tgtEl>
-                                          <p:spTgt spid="4">
-                                            <p:txEl>
-                                              <p:pRg st="6" end="6"/>
-                                            </p:txEl>
-                                          </p:spTgt>
-                                        </p:tgtEl>
-                                        <p:attrNameLst>
-                                          <p:attrName>style.visibility</p:attrName>
-                                        </p:attrNameLst>
-                                      </p:cBhvr>
-                                      <p:to>
-                                        <p:strVal val="visible"/>
-                                      </p:to>
-                                    </p:set>
-                                  </p:childTnLst>
-                                </p:cTn>
-                              </p:par>
-                            </p:childTnLst>
-                          </p:cTn>
-                        </p:par>
-                      </p:childTnLst>
-                    </p:cTn>
-                  </p:par>
-                  <p:par>
-                    <p:cTn id="31" fill="hold">
-                      <p:stCondLst>
-                        <p:cond delay="indefinite"/>
-                      </p:stCondLst>
-                      <p:childTnLst>
-                        <p:par>
-                          <p:cTn id="32" fill="hold">
-                            <p:stCondLst>
-                              <p:cond delay="0"/>
-                            </p:stCondLst>
-                            <p:childTnLst>
-                              <p:par>
-                                <p:cTn id="33" presetID="1" presetClass="entr" presetSubtype="0" fill="hold" grpId="0" nodeType="clickEffect">
-                                  <p:stCondLst>
-                                    <p:cond delay="0"/>
-                                  </p:stCondLst>
-                                  <p:childTnLst>
-                                    <p:set>
-                                      <p:cBhvr>
-                                        <p:cTn id="34" dur="1" fill="hold">
-                                          <p:stCondLst>
-                                            <p:cond delay="0"/>
-                                          </p:stCondLst>
-                                        </p:cTn>
-                                        <p:tgtEl>
-                                          <p:spTgt spid="4">
-                                            <p:txEl>
-                                              <p:pRg st="7" end="7"/>
-                                            </p:txEl>
-                                          </p:spTgt>
-                                        </p:tgtEl>
-                                        <p:attrNameLst>
-                                          <p:attrName>style.visibility</p:attrName>
-                                        </p:attrNameLst>
-                                      </p:cBhvr>
-                                      <p:to>
-                                        <p:strVal val="visible"/>
-                                      </p:to>
-                                    </p:set>
-                                  </p:childTnLst>
-                                </p:cTn>
-                              </p:par>
-                            </p:childTnLst>
-                          </p:cTn>
-                        </p:par>
-                      </p:childTnLst>
-                    </p:cTn>
-                  </p:par>
-                  <p:par>
-                    <p:cTn id="35" fill="hold">
-                      <p:stCondLst>
-                        <p:cond delay="indefinite"/>
-                      </p:stCondLst>
-                      <p:childTnLst>
-                        <p:par>
-                          <p:cTn id="36" fill="hold">
-                            <p:stCondLst>
-                              <p:cond delay="0"/>
-                            </p:stCondLst>
-                            <p:childTnLst>
-                              <p:par>
-                                <p:cTn id="37" presetID="1" presetClass="entr" presetSubtype="0" fill="hold" grpId="0" nodeType="clickEffect">
-                                  <p:stCondLst>
-                                    <p:cond delay="0"/>
-                                  </p:stCondLst>
-                                  <p:childTnLst>
-                                    <p:set>
-                                      <p:cBhvr>
-                                        <p:cTn id="38" dur="1" fill="hold">
-                                          <p:stCondLst>
-                                            <p:cond delay="0"/>
-                                          </p:stCondLst>
-                                        </p:cTn>
-                                        <p:tgtEl>
-                                          <p:spTgt spid="4">
-                                            <p:txEl>
-                                              <p:pRg st="8" end="8"/>
-                                            </p:txEl>
-                                          </p:spTgt>
-                                        </p:tgtEl>
-                                        <p:attrNameLst>
-                                          <p:attrName>style.visibility</p:attrName>
-                                        </p:attrNameLst>
-                                      </p:cBhvr>
-                                      <p:to>
-                                        <p:strVal val="visible"/>
-                                      </p:to>
-                                    </p:set>
-                                  </p:childTnLst>
-                                </p:cTn>
-                              </p:par>
-                            </p:childTnLst>
-                          </p:cTn>
-                        </p:par>
-                      </p:childTnLst>
-                    </p:cTn>
-                  </p:par>
-                  <p:par>
-                    <p:cTn id="39" fill="hold">
-                      <p:stCondLst>
-                        <p:cond delay="indefinite"/>
-                      </p:stCondLst>
-                      <p:childTnLst>
-                        <p:par>
-                          <p:cTn id="40" fill="hold">
-                            <p:stCondLst>
-                              <p:cond delay="0"/>
-                            </p:stCondLst>
-                            <p:childTnLst>
-                              <p:par>
-                                <p:cTn id="41" presetID="1" presetClass="entr" presetSubtype="0" fill="hold" grpId="0" nodeType="clickEffect">
-                                  <p:stCondLst>
-                                    <p:cond delay="0"/>
-                                  </p:stCondLst>
-                                  <p:childTnLst>
-                                    <p:set>
-                                      <p:cBhvr>
-                                        <p:cTn id="42" dur="1" fill="hold">
-                                          <p:stCondLst>
-                                            <p:cond delay="0"/>
-                                          </p:stCondLst>
-                                        </p:cTn>
-                                        <p:tgtEl>
-                                          <p:spTgt spid="4">
-                                            <p:txEl>
-                                              <p:pRg st="9" end="9"/>
-                                            </p:txEl>
-                                          </p:spTgt>
-                                        </p:tgtEl>
-                                        <p:attrNameLst>
-                                          <p:attrName>style.visibility</p:attrName>
-                                        </p:attrNameLst>
-                                      </p:cBhvr>
-                                      <p:to>
-                                        <p:strVal val="visible"/>
-                                      </p:to>
-                                    </p:set>
-                                  </p:childTnLst>
-                                </p:cTn>
-                              </p:par>
-                            </p:childTnLst>
-                          </p:cTn>
-                        </p:par>
-                      </p:childTnLst>
-                    </p:cTn>
-                  </p:par>
-                  <p:par>
-                    <p:cTn id="43" fill="hold">
-                      <p:stCondLst>
-                        <p:cond delay="indefinite"/>
-                      </p:stCondLst>
-                      <p:childTnLst>
-                        <p:par>
-                          <p:cTn id="44" fill="hold">
-                            <p:stCondLst>
-                              <p:cond delay="0"/>
-                            </p:stCondLst>
-                            <p:childTnLst>
-                              <p:par>
-                                <p:cTn id="45" presetID="1" presetClass="entr" presetSubtype="0" fill="hold" grpId="0" nodeType="clickEffect">
-                                  <p:stCondLst>
-                                    <p:cond delay="0"/>
-                                  </p:stCondLst>
-                                  <p:childTnLst>
-                                    <p:set>
-                                      <p:cBhvr>
-                                        <p:cTn id="46" dur="1" fill="hold">
-                                          <p:stCondLst>
-                                            <p:cond delay="0"/>
-                                          </p:stCondLst>
-                                        </p:cTn>
-                                        <p:tgtEl>
-                                          <p:spTgt spid="4">
-                                            <p:txEl>
-                                              <p:pRg st="10" end="10"/>
-                                            </p:txEl>
-                                          </p:spTgt>
-                                        </p:tgtEl>
-                                        <p:attrNameLst>
-                                          <p:attrName>style.visibility</p:attrName>
-                                        </p:attrNameLst>
-                                      </p:cBhvr>
-                                      <p:to>
-                                        <p:strVal val="visible"/>
-                                      </p:to>
-                                    </p:set>
-                                  </p:childTnLst>
-                                </p:cTn>
-                              </p:par>
-                            </p:childTnLst>
-                          </p:cTn>
-                        </p:par>
-                      </p:childTnLst>
-                    </p:cTn>
-                  </p:par>
-                  <p:par>
-                    <p:cTn id="47" fill="hold">
-                      <p:stCondLst>
-                        <p:cond delay="indefinite"/>
-                      </p:stCondLst>
-                      <p:childTnLst>
-                        <p:par>
-                          <p:cTn id="48" fill="hold">
-                            <p:stCondLst>
-                              <p:cond delay="0"/>
-                            </p:stCondLst>
-                            <p:childTnLst>
-                              <p:par>
-                                <p:cTn id="49" presetID="1" presetClass="entr" presetSubtype="0" fill="hold" grpId="0" nodeType="clickEffect">
-                                  <p:stCondLst>
-                                    <p:cond delay="0"/>
-                                  </p:stCondLst>
-                                  <p:childTnLst>
-                                    <p:set>
-                                      <p:cBhvr>
-                                        <p:cTn id="50" dur="1" fill="hold">
-                                          <p:stCondLst>
-                                            <p:cond delay="0"/>
-                                          </p:stCondLst>
-                                        </p:cTn>
-                                        <p:tgtEl>
-                                          <p:spTgt spid="4">
-                                            <p:txEl>
-                                              <p:pRg st="11" end="11"/>
-                                            </p:txEl>
-                                          </p:spTgt>
-                                        </p:tgtEl>
-                                        <p:attrNameLst>
-                                          <p:attrName>style.visibility</p:attrName>
-                                        </p:attrNameLst>
-                                      </p:cBhvr>
-                                      <p:to>
-                                        <p:strVal val="visible"/>
-                                      </p:to>
-                                    </p:set>
-                                  </p:childTnLst>
-                                </p:cTn>
-                              </p:par>
-                            </p:childTnLst>
-                          </p:cTn>
-                        </p:par>
-                      </p:childTnLst>
-                    </p:cTn>
-                  </p:par>
-                  <p:par>
-                    <p:cTn id="51" fill="hold">
-                      <p:stCondLst>
-                        <p:cond delay="indefinite"/>
-                      </p:stCondLst>
-                      <p:childTnLst>
-                        <p:par>
-                          <p:cTn id="52" fill="hold">
-                            <p:stCondLst>
-                              <p:cond delay="0"/>
-                            </p:stCondLst>
-                            <p:childTnLst>
-                              <p:par>
-                                <p:cTn id="53" presetID="1" presetClass="entr" presetSubtype="0" fill="hold" grpId="0" nodeType="clickEffect">
-                                  <p:stCondLst>
-                                    <p:cond delay="0"/>
-                                  </p:stCondLst>
-                                  <p:childTnLst>
-                                    <p:set>
-                                      <p:cBhvr>
-                                        <p:cTn id="54" dur="1" fill="hold">
-                                          <p:stCondLst>
-                                            <p:cond delay="0"/>
-                                          </p:stCondLst>
-                                        </p:cTn>
-                                        <p:tgtEl>
-                                          <p:spTgt spid="4">
-                                            <p:txEl>
-                                              <p:pRg st="12" end="12"/>
-                                            </p:txEl>
-                                          </p:spTgt>
-                                        </p:tgtEl>
-                                        <p:attrNameLst>
-                                          <p:attrName>style.visibility</p:attrName>
-                                        </p:attrNameLst>
-                                      </p:cBhvr>
-                                      <p:to>
-                                        <p:strVal val="visible"/>
-                                      </p:to>
-                                    </p:set>
-                                  </p:childTnLst>
-                                </p:cTn>
-                              </p:par>
-                            </p:childTnLst>
-                          </p:cTn>
-                        </p:par>
-                      </p:childTnLst>
-                    </p:cTn>
-                  </p:par>
-                  <p:par>
-                    <p:cTn id="55" fill="hold">
-                      <p:stCondLst>
-                        <p:cond delay="indefinite"/>
-                      </p:stCondLst>
-                      <p:childTnLst>
-                        <p:par>
-                          <p:cTn id="56" fill="hold">
-                            <p:stCondLst>
-                              <p:cond delay="0"/>
-                            </p:stCondLst>
-                            <p:childTnLst>
-                              <p:par>
-                                <p:cTn id="57" presetID="1" presetClass="entr" presetSubtype="0" fill="hold" grpId="0" nodeType="clickEffect">
-                                  <p:stCondLst>
-                                    <p:cond delay="0"/>
-                                  </p:stCondLst>
-                                  <p:childTnLst>
-                                    <p:set>
-                                      <p:cBhvr>
-                                        <p:cTn id="58" dur="1" fill="hold">
-                                          <p:stCondLst>
-                                            <p:cond delay="0"/>
-                                          </p:stCondLst>
-                                        </p:cTn>
-                                        <p:tgtEl>
-                                          <p:spTgt spid="4">
-                                            <p:txEl>
-                                              <p:pRg st="13" end="13"/>
                                             </p:txEl>
                                           </p:spTgt>
                                         </p:tgtEl>
@@ -14343,7 +13807,7 @@
         </p:spPr>
         <p:txBody>
           <a:bodyPr>
-            <a:normAutofit fontScale="77500" lnSpcReduction="20000"/>
+            <a:normAutofit fontScale="62500" lnSpcReduction="20000"/>
           </a:bodyPr>
           <a:lstStyle/>
           <a:p>
@@ -14370,7 +13834,6 @@
             </a:r>
           </a:p>
           <a:p>
-            <a:pPr lvl="1"/>
             <a:r>
               <a:rPr lang="en-AU" b="1" dirty="0"/>
               <a:t>Architecture</a:t>
@@ -14381,7 +13844,6 @@
             </a:r>
           </a:p>
           <a:p>
-            <a:pPr lvl="1"/>
             <a:r>
               <a:rPr lang="en-AU" b="1" dirty="0"/>
               <a:t>Purpose</a:t>
@@ -14392,7 +13854,6 @@
             </a:r>
           </a:p>
           <a:p>
-            <a:pPr lvl="1"/>
             <a:r>
               <a:rPr lang="en-AU" b="1" dirty="0"/>
               <a:t>Output</a:t>
@@ -14403,7 +13864,6 @@
             </a:r>
           </a:p>
           <a:p>
-            <a:pPr lvl="1"/>
             <a:r>
               <a:rPr lang="en-AU" b="1" dirty="0"/>
               <a:t>Innovation</a:t>
@@ -14414,6 +13874,9 @@
             </a:r>
           </a:p>
           <a:p>
+            <a:pPr marL="0" indent="0">
+              <a:buNone/>
+            </a:pPr>
             <a:r>
               <a:rPr lang="en-AU" b="1" dirty="0"/>
               <a:t>Modern Vision-Language Models (2024)</a:t>
@@ -14424,7 +13887,6 @@
             </a:r>
           </a:p>
           <a:p>
-            <a:pPr lvl="1"/>
             <a:r>
               <a:rPr lang="en-AU" b="1" dirty="0"/>
               <a:t>Architecture</a:t>
@@ -14435,7 +13897,6 @@
             </a:r>
           </a:p>
           <a:p>
-            <a:pPr lvl="1"/>
             <a:r>
               <a:rPr lang="en-AU" b="1" dirty="0"/>
               <a:t>Purpose</a:t>
@@ -14446,7 +13907,6 @@
             </a:r>
           </a:p>
           <a:p>
-            <a:pPr lvl="1"/>
             <a:r>
               <a:rPr lang="en-AU" b="1" dirty="0"/>
               <a:t>Output</a:t>
@@ -14457,7 +13917,6 @@
             </a:r>
           </a:p>
           <a:p>
-            <a:pPr lvl="1"/>
             <a:r>
               <a:rPr lang="en-AU" b="1" dirty="0"/>
               <a:t>Our Models</a:t>
@@ -14468,6 +13927,9 @@
             </a:r>
           </a:p>
           <a:p>
+            <a:pPr marL="0" indent="0">
+              <a:buNone/>
+            </a:pPr>
             <a:r>
               <a:rPr lang="en-AU" b="1" dirty="0"/>
               <a:t>Key Evolution for Tax Processing</a:t>
@@ -14502,6 +13964,9 @@
             </a:r>
           </a:p>
           <a:p>
+            <a:pPr marL="0" indent="0">
+              <a:buNone/>
+            </a:pPr>
             <a:r>
               <a:rPr lang="en-AU" b="1" dirty="0"/>
               <a:t>Technical Architecture</a:t>
@@ -14623,15 +14088,33 @@
                                   </p:childTnLst>
                                 </p:cTn>
                               </p:par>
+                            </p:childTnLst>
+                          </p:cTn>
+                        </p:par>
+                      </p:childTnLst>
+                    </p:cTn>
+                  </p:par>
+                  <p:par>
+                    <p:cTn id="11" fill="hold">
+                      <p:stCondLst>
+                        <p:cond delay="indefinite"/>
+                      </p:stCondLst>
+                      <p:childTnLst>
+                        <p:par>
+                          <p:cTn id="12" fill="hold">
+                            <p:stCondLst>
+                              <p:cond delay="0"/>
+                            </p:stCondLst>
+                            <p:childTnLst>
                               <p:par>
-                                <p:cTn id="11" presetID="1" presetClass="entr" presetSubtype="0" fill="hold" grpId="0" nodeType="withEffect">
+                                <p:cTn id="13" presetID="1" presetClass="entr" presetSubtype="0" fill="hold" grpId="0" nodeType="clickEffect">
                                   <p:stCondLst>
                                     <p:cond delay="0"/>
                                   </p:stCondLst>
                                   <p:childTnLst>
                                     <p:set>
                                       <p:cBhvr>
-                                        <p:cTn id="12" dur="1" fill="hold">
+                                        <p:cTn id="14" dur="1" fill="hold">
                                           <p:stCondLst>
                                             <p:cond delay="0"/>
                                           </p:stCondLst>
@@ -14654,70 +14137,26 @@
                                   </p:childTnLst>
                                 </p:cTn>
                               </p:par>
+                            </p:childTnLst>
+                          </p:cTn>
+                        </p:par>
+                      </p:childTnLst>
+                    </p:cTn>
+                  </p:par>
+                  <p:par>
+                    <p:cTn id="15" fill="hold">
+                      <p:stCondLst>
+                        <p:cond delay="indefinite"/>
+                      </p:stCondLst>
+                      <p:childTnLst>
+                        <p:par>
+                          <p:cTn id="16" fill="hold">
+                            <p:stCondLst>
+                              <p:cond delay="0"/>
+                            </p:stCondLst>
+                            <p:childTnLst>
                               <p:par>
-                                <p:cTn id="13" presetID="1" presetClass="entr" presetSubtype="0" fill="hold" grpId="0" nodeType="withEffect">
-                                  <p:stCondLst>
-                                    <p:cond delay="0"/>
-                                  </p:stCondLst>
-                                  <p:childTnLst>
-                                    <p:set>
-                                      <p:cBhvr>
-                                        <p:cTn id="14" dur="1" fill="hold">
-                                          <p:stCondLst>
-                                            <p:cond delay="0"/>
-                                          </p:stCondLst>
-                                        </p:cTn>
-                                        <p:tgtEl>
-                                          <p:spTgt spid="3">
-                                            <p:txEl>
-                                              <p:pRg st="3" end="3"/>
-                                            </p:txEl>
-                                          </p:spTgt>
-                                        </p:tgtEl>
-                                        <p:attrNameLst>
-                                          <p:attrName>style.visibility</p:attrName>
-                                        </p:attrNameLst>
-                                      </p:cBhvr>
-                                      <p:to>
-                                        <p:strVal val="visible"/>
-                                      </p:to>
-                                    </p:set>
-                                  </p:childTnLst>
-                                </p:cTn>
-                              </p:par>
-                              <p:par>
-                                <p:cTn id="15" presetID="1" presetClass="entr" presetSubtype="0" fill="hold" grpId="0" nodeType="withEffect">
-                                  <p:stCondLst>
-                                    <p:cond delay="0"/>
-                                  </p:stCondLst>
-                                  <p:childTnLst>
-                                    <p:set>
-                                      <p:cBhvr>
-                                        <p:cTn id="16" dur="1" fill="hold">
-                                          <p:stCondLst>
-                                            <p:cond delay="0"/>
-                                          </p:stCondLst>
-                                        </p:cTn>
-                                        <p:tgtEl>
-                                          <p:spTgt spid="3">
-                                            <p:txEl>
-                                              <p:pRg st="4" end="4"/>
-                                            </p:txEl>
-                                          </p:spTgt>
-                                        </p:tgtEl>
-                                        <p:attrNameLst>
-                                          <p:attrName>style.visibility</p:attrName>
-                                        </p:attrNameLst>
-                                      </p:cBhvr>
-                                      <p:to>
-                                        <p:strVal val="visible"/>
-                                      </p:to>
-                                    </p:set>
-                                  </p:childTnLst>
-                                </p:cTn>
-                              </p:par>
-                              <p:par>
-                                <p:cTn id="17" presetID="1" presetClass="entr" presetSubtype="0" fill="hold" grpId="0" nodeType="withEffect">
+                                <p:cTn id="17" presetID="1" presetClass="entr" presetSubtype="0" fill="hold" grpId="0" nodeType="clickEffect">
                                   <p:stCondLst>
                                     <p:cond delay="0"/>
                                   </p:stCondLst>
@@ -14732,7 +14171,7 @@
                                         <p:tgtEl>
                                           <p:spTgt spid="3">
                                             <p:txEl>
-                                              <p:pRg st="5" end="5"/>
+                                              <p:pRg st="3" end="3"/>
                                             </p:txEl>
                                           </p:spTgt>
                                         </p:tgtEl>
@@ -14781,7 +14220,7 @@
                                         <p:tgtEl>
                                           <p:spTgt spid="3">
                                             <p:txEl>
-                                              <p:pRg st="6" end="6"/>
+                                              <p:pRg st="4" end="4"/>
                                             </p:txEl>
                                           </p:spTgt>
                                         </p:tgtEl>
@@ -14796,15 +14235,33 @@
                                   </p:childTnLst>
                                 </p:cTn>
                               </p:par>
+                            </p:childTnLst>
+                          </p:cTn>
+                        </p:par>
+                      </p:childTnLst>
+                    </p:cTn>
+                  </p:par>
+                  <p:par>
+                    <p:cTn id="23" fill="hold">
+                      <p:stCondLst>
+                        <p:cond delay="indefinite"/>
+                      </p:stCondLst>
+                      <p:childTnLst>
+                        <p:par>
+                          <p:cTn id="24" fill="hold">
+                            <p:stCondLst>
+                              <p:cond delay="0"/>
+                            </p:stCondLst>
+                            <p:childTnLst>
                               <p:par>
-                                <p:cTn id="23" presetID="1" presetClass="entr" presetSubtype="0" fill="hold" grpId="0" nodeType="withEffect">
+                                <p:cTn id="25" presetID="1" presetClass="entr" presetSubtype="0" fill="hold" grpId="0" nodeType="clickEffect">
                                   <p:stCondLst>
                                     <p:cond delay="0"/>
                                   </p:stCondLst>
                                   <p:childTnLst>
                                     <p:set>
                                       <p:cBhvr>
-                                        <p:cTn id="24" dur="1" fill="hold">
+                                        <p:cTn id="26" dur="1" fill="hold">
                                           <p:stCondLst>
                                             <p:cond delay="0"/>
                                           </p:stCondLst>
@@ -14812,7 +14269,7 @@
                                         <p:tgtEl>
                                           <p:spTgt spid="3">
                                             <p:txEl>
-                                              <p:pRg st="7" end="7"/>
+                                              <p:pRg st="5" end="5"/>
                                             </p:txEl>
                                           </p:spTgt>
                                         </p:tgtEl>
@@ -14827,70 +14284,26 @@
                                   </p:childTnLst>
                                 </p:cTn>
                               </p:par>
+                            </p:childTnLst>
+                          </p:cTn>
+                        </p:par>
+                      </p:childTnLst>
+                    </p:cTn>
+                  </p:par>
+                  <p:par>
+                    <p:cTn id="27" fill="hold">
+                      <p:stCondLst>
+                        <p:cond delay="indefinite"/>
+                      </p:stCondLst>
+                      <p:childTnLst>
+                        <p:par>
+                          <p:cTn id="28" fill="hold">
+                            <p:stCondLst>
+                              <p:cond delay="0"/>
+                            </p:stCondLst>
+                            <p:childTnLst>
                               <p:par>
-                                <p:cTn id="25" presetID="1" presetClass="entr" presetSubtype="0" fill="hold" grpId="0" nodeType="withEffect">
-                                  <p:stCondLst>
-                                    <p:cond delay="0"/>
-                                  </p:stCondLst>
-                                  <p:childTnLst>
-                                    <p:set>
-                                      <p:cBhvr>
-                                        <p:cTn id="26" dur="1" fill="hold">
-                                          <p:stCondLst>
-                                            <p:cond delay="0"/>
-                                          </p:stCondLst>
-                                        </p:cTn>
-                                        <p:tgtEl>
-                                          <p:spTgt spid="3">
-                                            <p:txEl>
-                                              <p:pRg st="8" end="8"/>
-                                            </p:txEl>
-                                          </p:spTgt>
-                                        </p:tgtEl>
-                                        <p:attrNameLst>
-                                          <p:attrName>style.visibility</p:attrName>
-                                        </p:attrNameLst>
-                                      </p:cBhvr>
-                                      <p:to>
-                                        <p:strVal val="visible"/>
-                                      </p:to>
-                                    </p:set>
-                                  </p:childTnLst>
-                                </p:cTn>
-                              </p:par>
-                              <p:par>
-                                <p:cTn id="27" presetID="1" presetClass="entr" presetSubtype="0" fill="hold" grpId="0" nodeType="withEffect">
-                                  <p:stCondLst>
-                                    <p:cond delay="0"/>
-                                  </p:stCondLst>
-                                  <p:childTnLst>
-                                    <p:set>
-                                      <p:cBhvr>
-                                        <p:cTn id="28" dur="1" fill="hold">
-                                          <p:stCondLst>
-                                            <p:cond delay="0"/>
-                                          </p:stCondLst>
-                                        </p:cTn>
-                                        <p:tgtEl>
-                                          <p:spTgt spid="3">
-                                            <p:txEl>
-                                              <p:pRg st="9" end="9"/>
-                                            </p:txEl>
-                                          </p:spTgt>
-                                        </p:tgtEl>
-                                        <p:attrNameLst>
-                                          <p:attrName>style.visibility</p:attrName>
-                                        </p:attrNameLst>
-                                      </p:cBhvr>
-                                      <p:to>
-                                        <p:strVal val="visible"/>
-                                      </p:to>
-                                    </p:set>
-                                  </p:childTnLst>
-                                </p:cTn>
-                              </p:par>
-                              <p:par>
-                                <p:cTn id="29" presetID="1" presetClass="entr" presetSubtype="0" fill="hold" grpId="0" nodeType="withEffect">
+                                <p:cTn id="29" presetID="1" presetClass="entr" presetSubtype="0" fill="hold" grpId="0" nodeType="clickEffect">
                                   <p:stCondLst>
                                     <p:cond delay="0"/>
                                   </p:stCondLst>
@@ -14905,7 +14318,7 @@
                                         <p:tgtEl>
                                           <p:spTgt spid="3">
                                             <p:txEl>
-                                              <p:pRg st="10" end="10"/>
+                                              <p:pRg st="6" end="6"/>
                                             </p:txEl>
                                           </p:spTgt>
                                         </p:tgtEl>
@@ -14954,7 +14367,7 @@
                                         <p:tgtEl>
                                           <p:spTgt spid="3">
                                             <p:txEl>
-                                              <p:pRg st="11" end="11"/>
+                                              <p:pRg st="7" end="7"/>
                                             </p:txEl>
                                           </p:spTgt>
                                         </p:tgtEl>
@@ -15003,7 +14416,7 @@
                                         <p:tgtEl>
                                           <p:spTgt spid="3">
                                             <p:txEl>
-                                              <p:pRg st="12" end="12"/>
+                                              <p:pRg st="8" end="8"/>
                                             </p:txEl>
                                           </p:spTgt>
                                         </p:tgtEl>
@@ -15052,7 +14465,7 @@
                                         <p:tgtEl>
                                           <p:spTgt spid="3">
                                             <p:txEl>
-                                              <p:pRg st="13" end="13"/>
+                                              <p:pRg st="9" end="9"/>
                                             </p:txEl>
                                           </p:spTgt>
                                         </p:tgtEl>
@@ -15094,6 +14507,202 @@
                                     <p:set>
                                       <p:cBhvr>
                                         <p:cTn id="46" dur="1" fill="hold">
+                                          <p:stCondLst>
+                                            <p:cond delay="0"/>
+                                          </p:stCondLst>
+                                        </p:cTn>
+                                        <p:tgtEl>
+                                          <p:spTgt spid="3">
+                                            <p:txEl>
+                                              <p:pRg st="10" end="10"/>
+                                            </p:txEl>
+                                          </p:spTgt>
+                                        </p:tgtEl>
+                                        <p:attrNameLst>
+                                          <p:attrName>style.visibility</p:attrName>
+                                        </p:attrNameLst>
+                                      </p:cBhvr>
+                                      <p:to>
+                                        <p:strVal val="visible"/>
+                                      </p:to>
+                                    </p:set>
+                                  </p:childTnLst>
+                                </p:cTn>
+                              </p:par>
+                            </p:childTnLst>
+                          </p:cTn>
+                        </p:par>
+                      </p:childTnLst>
+                    </p:cTn>
+                  </p:par>
+                  <p:par>
+                    <p:cTn id="47" fill="hold">
+                      <p:stCondLst>
+                        <p:cond delay="indefinite"/>
+                      </p:stCondLst>
+                      <p:childTnLst>
+                        <p:par>
+                          <p:cTn id="48" fill="hold">
+                            <p:stCondLst>
+                              <p:cond delay="0"/>
+                            </p:stCondLst>
+                            <p:childTnLst>
+                              <p:par>
+                                <p:cTn id="49" presetID="1" presetClass="entr" presetSubtype="0" fill="hold" grpId="0" nodeType="clickEffect">
+                                  <p:stCondLst>
+                                    <p:cond delay="0"/>
+                                  </p:stCondLst>
+                                  <p:childTnLst>
+                                    <p:set>
+                                      <p:cBhvr>
+                                        <p:cTn id="50" dur="1" fill="hold">
+                                          <p:stCondLst>
+                                            <p:cond delay="0"/>
+                                          </p:stCondLst>
+                                        </p:cTn>
+                                        <p:tgtEl>
+                                          <p:spTgt spid="3">
+                                            <p:txEl>
+                                              <p:pRg st="11" end="11"/>
+                                            </p:txEl>
+                                          </p:spTgt>
+                                        </p:tgtEl>
+                                        <p:attrNameLst>
+                                          <p:attrName>style.visibility</p:attrName>
+                                        </p:attrNameLst>
+                                      </p:cBhvr>
+                                      <p:to>
+                                        <p:strVal val="visible"/>
+                                      </p:to>
+                                    </p:set>
+                                  </p:childTnLst>
+                                </p:cTn>
+                              </p:par>
+                            </p:childTnLst>
+                          </p:cTn>
+                        </p:par>
+                      </p:childTnLst>
+                    </p:cTn>
+                  </p:par>
+                  <p:par>
+                    <p:cTn id="51" fill="hold">
+                      <p:stCondLst>
+                        <p:cond delay="indefinite"/>
+                      </p:stCondLst>
+                      <p:childTnLst>
+                        <p:par>
+                          <p:cTn id="52" fill="hold">
+                            <p:stCondLst>
+                              <p:cond delay="0"/>
+                            </p:stCondLst>
+                            <p:childTnLst>
+                              <p:par>
+                                <p:cTn id="53" presetID="1" presetClass="entr" presetSubtype="0" fill="hold" grpId="0" nodeType="clickEffect">
+                                  <p:stCondLst>
+                                    <p:cond delay="0"/>
+                                  </p:stCondLst>
+                                  <p:childTnLst>
+                                    <p:set>
+                                      <p:cBhvr>
+                                        <p:cTn id="54" dur="1" fill="hold">
+                                          <p:stCondLst>
+                                            <p:cond delay="0"/>
+                                          </p:stCondLst>
+                                        </p:cTn>
+                                        <p:tgtEl>
+                                          <p:spTgt spid="3">
+                                            <p:txEl>
+                                              <p:pRg st="12" end="12"/>
+                                            </p:txEl>
+                                          </p:spTgt>
+                                        </p:tgtEl>
+                                        <p:attrNameLst>
+                                          <p:attrName>style.visibility</p:attrName>
+                                        </p:attrNameLst>
+                                      </p:cBhvr>
+                                      <p:to>
+                                        <p:strVal val="visible"/>
+                                      </p:to>
+                                    </p:set>
+                                  </p:childTnLst>
+                                </p:cTn>
+                              </p:par>
+                            </p:childTnLst>
+                          </p:cTn>
+                        </p:par>
+                      </p:childTnLst>
+                    </p:cTn>
+                  </p:par>
+                  <p:par>
+                    <p:cTn id="55" fill="hold">
+                      <p:stCondLst>
+                        <p:cond delay="indefinite"/>
+                      </p:stCondLst>
+                      <p:childTnLst>
+                        <p:par>
+                          <p:cTn id="56" fill="hold">
+                            <p:stCondLst>
+                              <p:cond delay="0"/>
+                            </p:stCondLst>
+                            <p:childTnLst>
+                              <p:par>
+                                <p:cTn id="57" presetID="1" presetClass="entr" presetSubtype="0" fill="hold" grpId="0" nodeType="clickEffect">
+                                  <p:stCondLst>
+                                    <p:cond delay="0"/>
+                                  </p:stCondLst>
+                                  <p:childTnLst>
+                                    <p:set>
+                                      <p:cBhvr>
+                                        <p:cTn id="58" dur="1" fill="hold">
+                                          <p:stCondLst>
+                                            <p:cond delay="0"/>
+                                          </p:stCondLst>
+                                        </p:cTn>
+                                        <p:tgtEl>
+                                          <p:spTgt spid="3">
+                                            <p:txEl>
+                                              <p:pRg st="13" end="13"/>
+                                            </p:txEl>
+                                          </p:spTgt>
+                                        </p:tgtEl>
+                                        <p:attrNameLst>
+                                          <p:attrName>style.visibility</p:attrName>
+                                        </p:attrNameLst>
+                                      </p:cBhvr>
+                                      <p:to>
+                                        <p:strVal val="visible"/>
+                                      </p:to>
+                                    </p:set>
+                                  </p:childTnLst>
+                                </p:cTn>
+                              </p:par>
+                            </p:childTnLst>
+                          </p:cTn>
+                        </p:par>
+                      </p:childTnLst>
+                    </p:cTn>
+                  </p:par>
+                  <p:par>
+                    <p:cTn id="59" fill="hold">
+                      <p:stCondLst>
+                        <p:cond delay="indefinite"/>
+                      </p:stCondLst>
+                      <p:childTnLst>
+                        <p:par>
+                          <p:cTn id="60" fill="hold">
+                            <p:stCondLst>
+                              <p:cond delay="0"/>
+                            </p:stCondLst>
+                            <p:childTnLst>
+                              <p:par>
+                                <p:cTn id="61" presetID="1" presetClass="entr" presetSubtype="0" fill="hold" grpId="0" nodeType="clickEffect">
+                                  <p:stCondLst>
+                                    <p:cond delay="0"/>
+                                  </p:stCondLst>
+                                  <p:childTnLst>
+                                    <p:set>
+                                      <p:cBhvr>
+                                        <p:cTn id="62" dur="1" fill="hold">
                                           <p:stCondLst>
                                             <p:cond delay="0"/>
                                           </p:stCondLst>

</xml_diff>